<commit_message>
GNS3 auto modifiy, add NWD picture
</commit_message>
<xml_diff>
--- a/NW_Design.pptx
+++ b/NW_Design.pptx
@@ -5,10 +5,10 @@
     <p:sldMasterId id="2147483648" r:id="rId4"/>
   </p:sldMasterIdLst>
   <p:sldIdLst>
-    <p:sldId id="256" r:id="rId5"/>
-    <p:sldId id="260" r:id="rId6"/>
-    <p:sldId id="261" r:id="rId7"/>
-    <p:sldId id="262" r:id="rId8"/>
+    <p:sldId id="262" r:id="rId5"/>
+    <p:sldId id="256" r:id="rId6"/>
+    <p:sldId id="260" r:id="rId7"/>
+    <p:sldId id="261" r:id="rId8"/>
     <p:sldId id="259" r:id="rId9"/>
     <p:sldId id="257" r:id="rId10"/>
     <p:sldId id="258" r:id="rId11"/>
@@ -3635,7 +3635,7 @@
         <p:spPr>
           <a:xfrm>
             <a:off x="127221" y="206734"/>
-            <a:ext cx="1832553" cy="369332"/>
+            <a:ext cx="1763624" cy="369332"/>
           </a:xfrm>
           <a:prstGeom prst="rect">
             <a:avLst/>
@@ -3649,8 +3649,12 @@
           <a:lstStyle/>
           <a:p>
             <a:r>
+              <a:rPr lang="en-US" altLang="ja-JP" b="1" u="sng" dirty="0"/>
+              <a:t>Oct</a:t>
+            </a:r>
+            <a:r>
               <a:rPr kumimoji="1" lang="en-US" altLang="ja-JP" b="1" u="sng" dirty="0"/>
-              <a:t>Aug. 11</a:t>
+              <a:t>. 14</a:t>
             </a:r>
             <a:r>
               <a:rPr kumimoji="1" lang="en-US" altLang="ja-JP" b="1" u="sng" baseline="30000" dirty="0"/>
@@ -3666,10 +3670,10 @@
       </p:sp>
       <p:pic>
         <p:nvPicPr>
-          <p:cNvPr id="4" name="図 3">
-            <a:extLst>
-              <a:ext uri="{FF2B5EF4-FFF2-40B4-BE49-F238E27FC236}">
-                <a16:creationId xmlns:a16="http://schemas.microsoft.com/office/drawing/2014/main" id="{531C011A-B055-4430-864B-9A00D44563CC}"/>
+          <p:cNvPr id="2" name="図 1">
+            <a:extLst>
+              <a:ext uri="{FF2B5EF4-FFF2-40B4-BE49-F238E27FC236}">
+                <a16:creationId xmlns:a16="http://schemas.microsoft.com/office/drawing/2014/main" id="{A6FD1B4C-F305-4268-A9AC-61B13A782DF0}"/>
               </a:ext>
             </a:extLst>
           </p:cNvPr>
@@ -3686,18 +3690,192 @@
         </p:blipFill>
         <p:spPr>
           <a:xfrm>
-            <a:off x="318052" y="577790"/>
-            <a:ext cx="11703593" cy="5775302"/>
+            <a:off x="1089329" y="576066"/>
+            <a:ext cx="10448014" cy="6109648"/>
           </a:xfrm>
           <a:prstGeom prst="rect">
             <a:avLst/>
           </a:prstGeom>
         </p:spPr>
       </p:pic>
+      <p:pic>
+        <p:nvPicPr>
+          <p:cNvPr id="6" name="Picture 20" descr="C:\Users\ecoffey\AppData\Local\Temp\Rar$DRa0.832\30100_Device_voice_router_unknown_64.png">
+            <a:extLst>
+              <a:ext uri="{FF2B5EF4-FFF2-40B4-BE49-F238E27FC236}">
+                <a16:creationId xmlns:a16="http://schemas.microsoft.com/office/drawing/2014/main" id="{36709E00-ECED-47DC-BDF9-E18F1F8092D7}"/>
+              </a:ext>
+            </a:extLst>
+          </p:cNvPr>
+          <p:cNvPicPr>
+            <a:picLocks noChangeAspect="1" noChangeArrowheads="1"/>
+          </p:cNvPicPr>
+          <p:nvPr/>
+        </p:nvPicPr>
+        <p:blipFill>
+          <a:blip r:embed="rId3">
+            <a:extLst>
+              <a:ext uri="{28A0092B-C50C-407E-A947-70E740481C1C}">
+                <a14:useLocalDpi xmlns:a14="http://schemas.microsoft.com/office/drawing/2010/main" val="0"/>
+              </a:ext>
+            </a:extLst>
+          </a:blip>
+          <a:srcRect/>
+          <a:stretch>
+            <a:fillRect/>
+          </a:stretch>
+        </p:blipFill>
+        <p:spPr bwMode="auto">
+          <a:xfrm>
+            <a:off x="10278831" y="1005781"/>
+            <a:ext cx="757580" cy="757580"/>
+          </a:xfrm>
+          <a:prstGeom prst="rect">
+            <a:avLst/>
+          </a:prstGeom>
+          <a:noFill/>
+          <a:extLst>
+            <a:ext uri="{909E8E84-426E-40DD-AFC4-6F175D3DCCD1}">
+              <a14:hiddenFill xmlns:a14="http://schemas.microsoft.com/office/drawing/2010/main">
+                <a:solidFill>
+                  <a:srgbClr val="FFFFFF"/>
+                </a:solidFill>
+              </a14:hiddenFill>
+            </a:ext>
+          </a:extLst>
+        </p:spPr>
+      </p:pic>
+      <p:cxnSp>
+        <p:nvCxnSpPr>
+          <p:cNvPr id="8" name="直線コネクタ 7">
+            <a:extLst>
+              <a:ext uri="{FF2B5EF4-FFF2-40B4-BE49-F238E27FC236}">
+                <a16:creationId xmlns:a16="http://schemas.microsoft.com/office/drawing/2014/main" id="{462070E5-5E00-4567-9A29-6FEDBA6B0EB5}"/>
+              </a:ext>
+            </a:extLst>
+          </p:cNvPr>
+          <p:cNvCxnSpPr>
+            <a:cxnSpLocks/>
+          </p:cNvCxnSpPr>
+          <p:nvPr/>
+        </p:nvCxnSpPr>
+        <p:spPr>
+          <a:xfrm>
+            <a:off x="9748299" y="1375577"/>
+            <a:ext cx="530532" cy="0"/>
+          </a:xfrm>
+          <a:prstGeom prst="line">
+            <a:avLst/>
+          </a:prstGeom>
+          <a:ln w="28575"/>
+        </p:spPr>
+        <p:style>
+          <a:lnRef idx="1">
+            <a:schemeClr val="accent1"/>
+          </a:lnRef>
+          <a:fillRef idx="0">
+            <a:schemeClr val="accent1"/>
+          </a:fillRef>
+          <a:effectRef idx="0">
+            <a:schemeClr val="accent1"/>
+          </a:effectRef>
+          <a:fontRef idx="minor">
+            <a:schemeClr val="tx1"/>
+          </a:fontRef>
+        </p:style>
+      </p:cxnSp>
+      <p:sp>
+        <p:nvSpPr>
+          <p:cNvPr id="12" name="テキスト ボックス 11">
+            <a:extLst>
+              <a:ext uri="{FF2B5EF4-FFF2-40B4-BE49-F238E27FC236}">
+                <a16:creationId xmlns:a16="http://schemas.microsoft.com/office/drawing/2014/main" id="{DF4A532F-D36C-4BE9-BE88-D7CE4E7BA6F1}"/>
+              </a:ext>
+            </a:extLst>
+          </p:cNvPr>
+          <p:cNvSpPr txBox="1"/>
+          <p:nvPr/>
+        </p:nvSpPr>
+        <p:spPr>
+          <a:xfrm>
+            <a:off x="9748299" y="767415"/>
+            <a:ext cx="1832553" cy="369332"/>
+          </a:xfrm>
+          <a:prstGeom prst="rect">
+            <a:avLst/>
+          </a:prstGeom>
+          <a:noFill/>
+        </p:spPr>
+        <p:txBody>
+          <a:bodyPr wrap="none" rtlCol="0">
+            <a:spAutoFit/>
+          </a:bodyPr>
+          <a:lstStyle/>
+          <a:p>
+            <a:r>
+              <a:rPr kumimoji="1" lang="en-US" altLang="ja-JP" dirty="0"/>
+              <a:t>Cisco CSR1000V</a:t>
+            </a:r>
+            <a:endParaRPr kumimoji="1" lang="ja-JP" altLang="en-US" dirty="0"/>
+          </a:p>
+        </p:txBody>
+      </p:sp>
+      <p:sp>
+        <p:nvSpPr>
+          <p:cNvPr id="13" name="乗算記号 12">
+            <a:extLst>
+              <a:ext uri="{FF2B5EF4-FFF2-40B4-BE49-F238E27FC236}">
+                <a16:creationId xmlns:a16="http://schemas.microsoft.com/office/drawing/2014/main" id="{5631C466-A9C3-422B-831C-692ADE82EFBD}"/>
+              </a:ext>
+            </a:extLst>
+          </p:cNvPr>
+          <p:cNvSpPr/>
+          <p:nvPr/>
+        </p:nvSpPr>
+        <p:spPr>
+          <a:xfrm>
+            <a:off x="6758610" y="2999629"/>
+            <a:ext cx="834887" cy="858741"/>
+          </a:xfrm>
+          <a:prstGeom prst="mathMultiply">
+            <a:avLst/>
+          </a:prstGeom>
+          <a:solidFill>
+            <a:schemeClr val="accent2"/>
+          </a:solidFill>
+          <a:ln>
+            <a:noFill/>
+          </a:ln>
+        </p:spPr>
+        <p:style>
+          <a:lnRef idx="2">
+            <a:schemeClr val="accent1">
+              <a:shade val="50000"/>
+            </a:schemeClr>
+          </a:lnRef>
+          <a:fillRef idx="1">
+            <a:schemeClr val="accent1"/>
+          </a:fillRef>
+          <a:effectRef idx="0">
+            <a:schemeClr val="accent1"/>
+          </a:effectRef>
+          <a:fontRef idx="minor">
+            <a:schemeClr val="lt1"/>
+          </a:fontRef>
+        </p:style>
+        <p:txBody>
+          <a:bodyPr rtlCol="0" anchor="ctr"/>
+          <a:lstStyle/>
+          <a:p>
+            <a:pPr algn="ctr"/>
+            <a:endParaRPr kumimoji="1" lang="ja-JP" altLang="en-US"/>
+          </a:p>
+        </p:txBody>
+      </p:sp>
     </p:spTree>
     <p:extLst>
       <p:ext uri="{BB962C8B-B14F-4D97-AF65-F5344CB8AC3E}">
-        <p14:creationId xmlns:p14="http://schemas.microsoft.com/office/powerpoint/2010/main" val="1904452169"/>
+        <p14:creationId xmlns:p14="http://schemas.microsoft.com/office/powerpoint/2010/main" val="2857905600"/>
       </p:ext>
     </p:extLst>
   </p:cSld>
@@ -3729,7 +3907,7 @@
           <p:cNvPr id="3" name="テキスト ボックス 2">
             <a:extLst>
               <a:ext uri="{FF2B5EF4-FFF2-40B4-BE49-F238E27FC236}">
-                <a16:creationId xmlns:a16="http://schemas.microsoft.com/office/drawing/2014/main" id="{DEA60B48-225B-4F53-8266-1BB4FDA18E28}"/>
+                <a16:creationId xmlns:a16="http://schemas.microsoft.com/office/drawing/2014/main" id="{4C21324B-73FE-427F-BBC9-0DD00CA0AA9B}"/>
               </a:ext>
             </a:extLst>
           </p:cNvPr>
@@ -3739,7 +3917,7 @@
         <p:spPr>
           <a:xfrm>
             <a:off x="127221" y="206734"/>
-            <a:ext cx="2159566" cy="369332"/>
+            <a:ext cx="1832553" cy="369332"/>
           </a:xfrm>
           <a:prstGeom prst="rect">
             <a:avLst/>
@@ -3754,411 +3932,54 @@
           <a:p>
             <a:r>
               <a:rPr kumimoji="1" lang="en-US" altLang="ja-JP" b="1" u="sng" dirty="0"/>
-              <a:t>DHCP - </a:t>
-            </a:r>
-            <a:r>
-              <a:rPr kumimoji="1" lang="en-US" altLang="ja-JP" b="1" u="sng" dirty="0" err="1"/>
-              <a:t>Linuxbean</a:t>
+              <a:t>Aug. 11</a:t>
+            </a:r>
+            <a:r>
+              <a:rPr kumimoji="1" lang="en-US" altLang="ja-JP" b="1" u="sng" baseline="30000" dirty="0"/>
+              <a:t>th</a:t>
+            </a:r>
+            <a:r>
+              <a:rPr kumimoji="1" lang="en-US" altLang="ja-JP" b="1" u="sng" dirty="0"/>
+              <a:t>, 2020</a:t>
             </a:r>
             <a:endParaRPr kumimoji="1" lang="ja-JP" altLang="en-US" b="1" u="sng" dirty="0"/>
           </a:p>
         </p:txBody>
       </p:sp>
-      <p:sp>
-        <p:nvSpPr>
-          <p:cNvPr id="5" name="テキスト ボックス 4">
-            <a:extLst>
-              <a:ext uri="{FF2B5EF4-FFF2-40B4-BE49-F238E27FC236}">
-                <a16:creationId xmlns:a16="http://schemas.microsoft.com/office/drawing/2014/main" id="{4F89FE2A-2238-4C14-9015-D099A43C3E56}"/>
-              </a:ext>
-            </a:extLst>
-          </p:cNvPr>
-          <p:cNvSpPr txBox="1"/>
+      <p:pic>
+        <p:nvPicPr>
+          <p:cNvPr id="4" name="図 3">
+            <a:extLst>
+              <a:ext uri="{FF2B5EF4-FFF2-40B4-BE49-F238E27FC236}">
+                <a16:creationId xmlns:a16="http://schemas.microsoft.com/office/drawing/2014/main" id="{531C011A-B055-4430-864B-9A00D44563CC}"/>
+              </a:ext>
+            </a:extLst>
+          </p:cNvPr>
+          <p:cNvPicPr>
+            <a:picLocks noChangeAspect="1"/>
+          </p:cNvPicPr>
           <p:nvPr/>
-        </p:nvSpPr>
+        </p:nvPicPr>
+        <p:blipFill>
+          <a:blip r:embed="rId2"/>
+          <a:stretch>
+            <a:fillRect/>
+          </a:stretch>
+        </p:blipFill>
         <p:spPr>
           <a:xfrm>
-            <a:off x="2286787" y="206734"/>
-            <a:ext cx="2447013" cy="369332"/>
+            <a:off x="318052" y="577790"/>
+            <a:ext cx="11703593" cy="5775302"/>
           </a:xfrm>
           <a:prstGeom prst="rect">
             <a:avLst/>
           </a:prstGeom>
-          <a:noFill/>
-        </p:spPr>
-        <p:txBody>
-          <a:bodyPr wrap="square">
-            <a:spAutoFit/>
-          </a:bodyPr>
-          <a:lstStyle/>
-          <a:p>
-            <a:r>
-              <a:rPr lang="en-US" altLang="ja-JP" dirty="0"/>
-              <a:t>/</a:t>
-            </a:r>
-            <a:r>
-              <a:rPr lang="en-US" altLang="ja-JP" dirty="0" err="1"/>
-              <a:t>etc</a:t>
-            </a:r>
-            <a:r>
-              <a:rPr lang="en-US" altLang="ja-JP" dirty="0"/>
-              <a:t>/</a:t>
-            </a:r>
-            <a:r>
-              <a:rPr lang="en-US" altLang="ja-JP" dirty="0" err="1"/>
-              <a:t>dhcp</a:t>
-            </a:r>
-            <a:r>
-              <a:rPr lang="en-US" altLang="ja-JP" dirty="0"/>
-              <a:t>/</a:t>
-            </a:r>
-            <a:r>
-              <a:rPr lang="en-US" altLang="ja-JP" dirty="0" err="1"/>
-              <a:t>dhcpd.conf</a:t>
-            </a:r>
-            <a:endParaRPr lang="ja-JP" altLang="en-US" dirty="0"/>
-          </a:p>
-        </p:txBody>
-      </p:sp>
-      <p:sp>
-        <p:nvSpPr>
-          <p:cNvPr id="7" name="テキスト ボックス 6">
-            <a:extLst>
-              <a:ext uri="{FF2B5EF4-FFF2-40B4-BE49-F238E27FC236}">
-                <a16:creationId xmlns:a16="http://schemas.microsoft.com/office/drawing/2014/main" id="{7FC0C65A-AEF7-44DD-BF95-A63EF7E133F6}"/>
-              </a:ext>
-            </a:extLst>
-          </p:cNvPr>
-          <p:cNvSpPr txBox="1"/>
-          <p:nvPr/>
-        </p:nvSpPr>
-        <p:spPr>
-          <a:xfrm>
-            <a:off x="127221" y="576066"/>
-            <a:ext cx="4606579" cy="4616648"/>
-          </a:xfrm>
-          <a:prstGeom prst="rect">
-            <a:avLst/>
-          </a:prstGeom>
-          <a:noFill/>
-        </p:spPr>
-        <p:txBody>
-          <a:bodyPr wrap="square">
-            <a:spAutoFit/>
-          </a:bodyPr>
-          <a:lstStyle/>
-          <a:p>
-            <a:r>
-              <a:rPr lang="en-US" altLang="ja-JP" sz="1400" dirty="0">
-                <a:latin typeface="MeiryoKe_Console" panose="020B0609030504040204" pitchFamily="49" charset="-128"/>
-                <a:ea typeface="MeiryoKe_Console" panose="020B0609030504040204" pitchFamily="49" charset="-128"/>
-              </a:rPr>
-              <a:t>subnet 192.168.10.16 netmask 255.255.255.240 {</a:t>
-            </a:r>
-          </a:p>
-          <a:p>
-            <a:r>
-              <a:rPr lang="en-US" altLang="ja-JP" sz="1400" dirty="0">
-                <a:latin typeface="MeiryoKe_Console" panose="020B0609030504040204" pitchFamily="49" charset="-128"/>
-                <a:ea typeface="MeiryoKe_Console" panose="020B0609030504040204" pitchFamily="49" charset="-128"/>
-              </a:rPr>
-              <a:t> pool{</a:t>
-            </a:r>
-          </a:p>
-          <a:p>
-            <a:r>
-              <a:rPr lang="en-US" altLang="ja-JP" sz="1400" dirty="0">
-                <a:latin typeface="MeiryoKe_Console" panose="020B0609030504040204" pitchFamily="49" charset="-128"/>
-                <a:ea typeface="MeiryoKe_Console" panose="020B0609030504040204" pitchFamily="49" charset="-128"/>
-              </a:rPr>
-              <a:t>  option routers 192.168.10.30;</a:t>
-            </a:r>
-          </a:p>
-          <a:p>
-            <a:r>
-              <a:rPr lang="en-US" altLang="ja-JP" sz="1400" dirty="0">
-                <a:latin typeface="MeiryoKe_Console" panose="020B0609030504040204" pitchFamily="49" charset="-128"/>
-                <a:ea typeface="MeiryoKe_Console" panose="020B0609030504040204" pitchFamily="49" charset="-128"/>
-              </a:rPr>
-              <a:t>  range 192.168.10.20 192.168.10.29;</a:t>
-            </a:r>
-          </a:p>
-          <a:p>
-            <a:r>
-              <a:rPr lang="en-US" altLang="ja-JP" sz="1400" dirty="0">
-                <a:latin typeface="MeiryoKe_Console" panose="020B0609030504040204" pitchFamily="49" charset="-128"/>
-                <a:ea typeface="MeiryoKe_Console" panose="020B0609030504040204" pitchFamily="49" charset="-128"/>
-              </a:rPr>
-              <a:t> }</a:t>
-            </a:r>
-          </a:p>
-          <a:p>
-            <a:r>
-              <a:rPr lang="en-US" altLang="ja-JP" sz="1400" dirty="0">
-                <a:latin typeface="MeiryoKe_Console" panose="020B0609030504040204" pitchFamily="49" charset="-128"/>
-                <a:ea typeface="MeiryoKe_Console" panose="020B0609030504040204" pitchFamily="49" charset="-128"/>
-              </a:rPr>
-              <a:t>}</a:t>
-            </a:r>
-          </a:p>
-          <a:p>
-            <a:endParaRPr lang="en-US" altLang="ja-JP" sz="1400" dirty="0">
-              <a:latin typeface="MeiryoKe_Console" panose="020B0609030504040204" pitchFamily="49" charset="-128"/>
-              <a:ea typeface="MeiryoKe_Console" panose="020B0609030504040204" pitchFamily="49" charset="-128"/>
-            </a:endParaRPr>
-          </a:p>
-          <a:p>
-            <a:r>
-              <a:rPr lang="en-US" altLang="ja-JP" sz="1400" dirty="0">
-                <a:latin typeface="MeiryoKe_Console" panose="020B0609030504040204" pitchFamily="49" charset="-128"/>
-                <a:ea typeface="MeiryoKe_Console" panose="020B0609030504040204" pitchFamily="49" charset="-128"/>
-              </a:rPr>
-              <a:t>subnet 192.168.20.32 netmask 255.255.255.248 {</a:t>
-            </a:r>
-          </a:p>
-          <a:p>
-            <a:r>
-              <a:rPr lang="en-US" altLang="ja-JP" sz="1400" dirty="0">
-                <a:latin typeface="MeiryoKe_Console" panose="020B0609030504040204" pitchFamily="49" charset="-128"/>
-                <a:ea typeface="MeiryoKe_Console" panose="020B0609030504040204" pitchFamily="49" charset="-128"/>
-              </a:rPr>
-              <a:t> pool{</a:t>
-            </a:r>
-          </a:p>
-          <a:p>
-            <a:r>
-              <a:rPr lang="en-US" altLang="ja-JP" sz="1400" dirty="0">
-                <a:latin typeface="MeiryoKe_Console" panose="020B0609030504040204" pitchFamily="49" charset="-128"/>
-                <a:ea typeface="MeiryoKe_Console" panose="020B0609030504040204" pitchFamily="49" charset="-128"/>
-              </a:rPr>
-              <a:t>  option routers 192.168.20.38;</a:t>
-            </a:r>
-          </a:p>
-          <a:p>
-            <a:r>
-              <a:rPr lang="en-US" altLang="ja-JP" sz="1400" dirty="0">
-                <a:latin typeface="MeiryoKe_Console" panose="020B0609030504040204" pitchFamily="49" charset="-128"/>
-                <a:ea typeface="MeiryoKe_Console" panose="020B0609030504040204" pitchFamily="49" charset="-128"/>
-              </a:rPr>
-              <a:t>  range 192.168.20.33 192.168.20.37;</a:t>
-            </a:r>
-          </a:p>
-          <a:p>
-            <a:r>
-              <a:rPr lang="en-US" altLang="ja-JP" sz="1400" dirty="0">
-                <a:latin typeface="MeiryoKe_Console" panose="020B0609030504040204" pitchFamily="49" charset="-128"/>
-                <a:ea typeface="MeiryoKe_Console" panose="020B0609030504040204" pitchFamily="49" charset="-128"/>
-              </a:rPr>
-              <a:t> }</a:t>
-            </a:r>
-          </a:p>
-          <a:p>
-            <a:r>
-              <a:rPr lang="en-US" altLang="ja-JP" sz="1400" dirty="0">
-                <a:latin typeface="MeiryoKe_Console" panose="020B0609030504040204" pitchFamily="49" charset="-128"/>
-                <a:ea typeface="MeiryoKe_Console" panose="020B0609030504040204" pitchFamily="49" charset="-128"/>
-              </a:rPr>
-              <a:t>}</a:t>
-            </a:r>
-          </a:p>
-          <a:p>
-            <a:endParaRPr lang="en-US" altLang="ja-JP" sz="1400" dirty="0">
-              <a:latin typeface="MeiryoKe_Console" panose="020B0609030504040204" pitchFamily="49" charset="-128"/>
-              <a:ea typeface="MeiryoKe_Console" panose="020B0609030504040204" pitchFamily="49" charset="-128"/>
-            </a:endParaRPr>
-          </a:p>
-          <a:p>
-            <a:r>
-              <a:rPr lang="en-US" altLang="ja-JP" sz="1400" dirty="0" err="1">
-                <a:latin typeface="MeiryoKe_Console" panose="020B0609030504040204" pitchFamily="49" charset="-128"/>
-                <a:ea typeface="MeiryoKe_Console" panose="020B0609030504040204" pitchFamily="49" charset="-128"/>
-              </a:rPr>
-              <a:t>ddns</a:t>
-            </a:r>
-            <a:r>
-              <a:rPr lang="en-US" altLang="ja-JP" sz="1400" dirty="0">
-                <a:latin typeface="MeiryoKe_Console" panose="020B0609030504040204" pitchFamily="49" charset="-128"/>
-                <a:ea typeface="MeiryoKe_Console" panose="020B0609030504040204" pitchFamily="49" charset="-128"/>
-              </a:rPr>
-              <a:t>-update-style interim;</a:t>
-            </a:r>
-          </a:p>
-          <a:p>
-            <a:r>
-              <a:rPr lang="en-US" altLang="ja-JP" sz="1400" dirty="0">
-                <a:latin typeface="MeiryoKe_Console" panose="020B0609030504040204" pitchFamily="49" charset="-128"/>
-                <a:ea typeface="MeiryoKe_Console" panose="020B0609030504040204" pitchFamily="49" charset="-128"/>
-              </a:rPr>
-              <a:t>zone toshi.com. {</a:t>
-            </a:r>
-          </a:p>
-          <a:p>
-            <a:r>
-              <a:rPr lang="en-US" altLang="ja-JP" sz="1400" dirty="0">
-                <a:latin typeface="MeiryoKe_Console" panose="020B0609030504040204" pitchFamily="49" charset="-128"/>
-                <a:ea typeface="MeiryoKe_Console" panose="020B0609030504040204" pitchFamily="49" charset="-128"/>
-              </a:rPr>
-              <a:t>primary 127.0.0.1;</a:t>
-            </a:r>
-          </a:p>
-          <a:p>
-            <a:r>
-              <a:rPr lang="en-US" altLang="ja-JP" sz="1400" dirty="0">
-                <a:latin typeface="MeiryoKe_Console" panose="020B0609030504040204" pitchFamily="49" charset="-128"/>
-                <a:ea typeface="MeiryoKe_Console" panose="020B0609030504040204" pitchFamily="49" charset="-128"/>
-              </a:rPr>
-              <a:t>}</a:t>
-            </a:r>
-          </a:p>
-          <a:p>
-            <a:r>
-              <a:rPr lang="en-US" altLang="ja-JP" sz="1400" dirty="0">
-                <a:latin typeface="MeiryoKe_Console" panose="020B0609030504040204" pitchFamily="49" charset="-128"/>
-                <a:ea typeface="MeiryoKe_Console" panose="020B0609030504040204" pitchFamily="49" charset="-128"/>
-              </a:rPr>
-              <a:t>zone 168.192.in-addr.arpa. {</a:t>
-            </a:r>
-          </a:p>
-          <a:p>
-            <a:r>
-              <a:rPr lang="en-US" altLang="ja-JP" sz="1400" dirty="0">
-                <a:latin typeface="MeiryoKe_Console" panose="020B0609030504040204" pitchFamily="49" charset="-128"/>
-                <a:ea typeface="MeiryoKe_Console" panose="020B0609030504040204" pitchFamily="49" charset="-128"/>
-              </a:rPr>
-              <a:t>primary 127.0.0.1;</a:t>
-            </a:r>
-          </a:p>
-          <a:p>
-            <a:r>
-              <a:rPr lang="en-US" altLang="ja-JP" sz="1400" dirty="0">
-                <a:latin typeface="MeiryoKe_Console" panose="020B0609030504040204" pitchFamily="49" charset="-128"/>
-                <a:ea typeface="MeiryoKe_Console" panose="020B0609030504040204" pitchFamily="49" charset="-128"/>
-              </a:rPr>
-              <a:t>}</a:t>
-            </a:r>
-            <a:endParaRPr lang="ja-JP" altLang="en-US" sz="1400" dirty="0">
-              <a:latin typeface="MeiryoKe_Console" panose="020B0609030504040204" pitchFamily="49" charset="-128"/>
-              <a:ea typeface="MeiryoKe_Console" panose="020B0609030504040204" pitchFamily="49" charset="-128"/>
-            </a:endParaRPr>
-          </a:p>
-        </p:txBody>
-      </p:sp>
-      <p:sp>
-        <p:nvSpPr>
-          <p:cNvPr id="8" name="テキスト ボックス 7">
-            <a:extLst>
-              <a:ext uri="{FF2B5EF4-FFF2-40B4-BE49-F238E27FC236}">
-                <a16:creationId xmlns:a16="http://schemas.microsoft.com/office/drawing/2014/main" id="{C9DEB816-2591-43D9-9044-DD48B3495FA3}"/>
-              </a:ext>
-            </a:extLst>
-          </p:cNvPr>
-          <p:cNvSpPr txBox="1"/>
-          <p:nvPr/>
-        </p:nvSpPr>
-        <p:spPr>
-          <a:xfrm>
-            <a:off x="5348039" y="576066"/>
-            <a:ext cx="3446104" cy="2862322"/>
-          </a:xfrm>
-          <a:prstGeom prst="rect">
-            <a:avLst/>
-          </a:prstGeom>
-          <a:solidFill>
-            <a:schemeClr val="accent2">
-              <a:lumMod val="20000"/>
-              <a:lumOff val="80000"/>
-            </a:schemeClr>
-          </a:solidFill>
-        </p:spPr>
-        <p:txBody>
-          <a:bodyPr wrap="square">
-            <a:spAutoFit/>
-          </a:bodyPr>
-          <a:lstStyle/>
-          <a:p>
-            <a:r>
-              <a:rPr lang="en-US" altLang="ja-JP" dirty="0"/>
-              <a:t>DHCP Range 01:</a:t>
-            </a:r>
-          </a:p>
-          <a:p>
-            <a:pPr marL="285750" indent="-285750">
-              <a:buFontTx/>
-              <a:buChar char="-"/>
-            </a:pPr>
-            <a:r>
-              <a:rPr lang="en-US" altLang="ja-JP" dirty="0"/>
-              <a:t>NW: 192.168.10.16/28 </a:t>
-            </a:r>
-          </a:p>
-          <a:p>
-            <a:pPr marL="285750" indent="-285750">
-              <a:buFontTx/>
-              <a:buChar char="-"/>
-            </a:pPr>
-            <a:r>
-              <a:rPr lang="en-US" altLang="ja-JP" dirty="0"/>
-              <a:t>DHCP Host: .20 - .29</a:t>
-            </a:r>
-          </a:p>
-          <a:p>
-            <a:pPr marL="285750" indent="-285750">
-              <a:buFontTx/>
-              <a:buChar char="-"/>
-            </a:pPr>
-            <a:r>
-              <a:rPr lang="en-US" altLang="ja-JP" dirty="0"/>
-              <a:t>Default GW: 192.168.10.30</a:t>
-            </a:r>
-          </a:p>
-          <a:p>
-            <a:endParaRPr lang="en-US" altLang="ja-JP" dirty="0"/>
-          </a:p>
-          <a:p>
-            <a:r>
-              <a:rPr lang="en-US" altLang="ja-JP" dirty="0"/>
-              <a:t>DHCP Range 02:</a:t>
-            </a:r>
-          </a:p>
-          <a:p>
-            <a:pPr marL="285750" indent="-285750">
-              <a:buFontTx/>
-              <a:buChar char="-"/>
-            </a:pPr>
-            <a:r>
-              <a:rPr lang="en-US" altLang="ja-JP" dirty="0"/>
-              <a:t>NW: 192.168.20.32/29 </a:t>
-            </a:r>
-          </a:p>
-          <a:p>
-            <a:pPr marL="285750" indent="-285750">
-              <a:buFontTx/>
-              <a:buChar char="-"/>
-            </a:pPr>
-            <a:r>
-              <a:rPr lang="en-US" altLang="ja-JP" dirty="0"/>
-              <a:t>DHCP Host: .33 - .37</a:t>
-            </a:r>
-          </a:p>
-          <a:p>
-            <a:pPr marL="285750" indent="-285750">
-              <a:buFontTx/>
-              <a:buChar char="-"/>
-            </a:pPr>
-            <a:r>
-              <a:rPr lang="en-US" altLang="ja-JP" dirty="0"/>
-              <a:t>Default GW: 192.168.10.38</a:t>
-            </a:r>
-          </a:p>
-          <a:p>
-            <a:endParaRPr lang="ja-JP" altLang="en-US" dirty="0"/>
-          </a:p>
-        </p:txBody>
-      </p:sp>
+        </p:spPr>
+      </p:pic>
     </p:spTree>
     <p:extLst>
       <p:ext uri="{BB962C8B-B14F-4D97-AF65-F5344CB8AC3E}">
-        <p14:creationId xmlns:p14="http://schemas.microsoft.com/office/powerpoint/2010/main" val="1823354145"/>
+        <p14:creationId xmlns:p14="http://schemas.microsoft.com/office/powerpoint/2010/main" val="1904452169"/>
       </p:ext>
     </p:extLst>
   </p:cSld>
@@ -4200,7 +4021,7 @@
         <p:spPr>
           <a:xfrm>
             <a:off x="127221" y="206734"/>
-            <a:ext cx="2010487" cy="369332"/>
+            <a:ext cx="2159566" cy="369332"/>
           </a:xfrm>
           <a:prstGeom prst="rect">
             <a:avLst/>
@@ -4215,13 +4036,69 @@
           <a:p>
             <a:r>
               <a:rPr kumimoji="1" lang="en-US" altLang="ja-JP" b="1" u="sng" dirty="0"/>
-              <a:t>DNS - </a:t>
+              <a:t>DHCP - </a:t>
             </a:r>
             <a:r>
               <a:rPr kumimoji="1" lang="en-US" altLang="ja-JP" b="1" u="sng" dirty="0" err="1"/>
               <a:t>Linuxbean</a:t>
             </a:r>
             <a:endParaRPr kumimoji="1" lang="ja-JP" altLang="en-US" b="1" u="sng" dirty="0"/>
+          </a:p>
+        </p:txBody>
+      </p:sp>
+      <p:sp>
+        <p:nvSpPr>
+          <p:cNvPr id="5" name="テキスト ボックス 4">
+            <a:extLst>
+              <a:ext uri="{FF2B5EF4-FFF2-40B4-BE49-F238E27FC236}">
+                <a16:creationId xmlns:a16="http://schemas.microsoft.com/office/drawing/2014/main" id="{4F89FE2A-2238-4C14-9015-D099A43C3E56}"/>
+              </a:ext>
+            </a:extLst>
+          </p:cNvPr>
+          <p:cNvSpPr txBox="1"/>
+          <p:nvPr/>
+        </p:nvSpPr>
+        <p:spPr>
+          <a:xfrm>
+            <a:off x="2286787" y="206734"/>
+            <a:ext cx="2447013" cy="369332"/>
+          </a:xfrm>
+          <a:prstGeom prst="rect">
+            <a:avLst/>
+          </a:prstGeom>
+          <a:noFill/>
+        </p:spPr>
+        <p:txBody>
+          <a:bodyPr wrap="square">
+            <a:spAutoFit/>
+          </a:bodyPr>
+          <a:lstStyle/>
+          <a:p>
+            <a:r>
+              <a:rPr lang="en-US" altLang="ja-JP" dirty="0"/>
+              <a:t>/</a:t>
+            </a:r>
+            <a:r>
+              <a:rPr lang="en-US" altLang="ja-JP" dirty="0" err="1"/>
+              <a:t>etc</a:t>
+            </a:r>
+            <a:r>
+              <a:rPr lang="en-US" altLang="ja-JP" dirty="0"/>
+              <a:t>/</a:t>
+            </a:r>
+            <a:r>
+              <a:rPr lang="en-US" altLang="ja-JP" dirty="0" err="1"/>
+              <a:t>dhcp</a:t>
+            </a:r>
+            <a:r>
+              <a:rPr lang="en-US" altLang="ja-JP" dirty="0"/>
+              <a:t>/</a:t>
+            </a:r>
+            <a:r>
+              <a:rPr lang="en-US" altLang="ja-JP" dirty="0" err="1"/>
+              <a:t>dhcpd.conf</a:t>
+            </a:r>
+            <a:endParaRPr lang="ja-JP" altLang="en-US" dirty="0"/>
           </a:p>
         </p:txBody>
       </p:sp>
@@ -4240,7 +4117,7 @@
         <p:spPr>
           <a:xfrm>
             <a:off x="127221" y="576066"/>
-            <a:ext cx="5621572" cy="3754874"/>
+            <a:ext cx="4606579" cy="4616648"/>
           </a:xfrm>
           <a:prstGeom prst="rect">
             <a:avLst/>
@@ -4253,224 +4130,13 @@
           </a:bodyPr>
           <a:lstStyle/>
           <a:p>
-            <a:pPr rtl="0">
-              <a:spcBef>
-                <a:spcPts val="0"/>
-              </a:spcBef>
-              <a:spcAft>
-                <a:spcPts val="0"/>
-              </a:spcAft>
-            </a:pPr>
-            <a:r>
-              <a:rPr lang="en-US" altLang="ja-JP" sz="1400" b="1" i="0" u="sng" strike="noStrike" dirty="0">
-                <a:solidFill>
-                  <a:srgbClr val="000000"/>
-                </a:solidFill>
-                <a:effectLst/>
-                <a:latin typeface="MeiryoKe_Console" panose="020B0609030504040204" pitchFamily="49" charset="-128"/>
-                <a:ea typeface="MeiryoKe_Console" panose="020B0609030504040204" pitchFamily="49" charset="-128"/>
-              </a:rPr>
-              <a:t>$ /</a:t>
-            </a:r>
-            <a:r>
-              <a:rPr lang="en-US" altLang="ja-JP" sz="1400" b="1" i="0" u="sng" strike="noStrike" dirty="0" err="1">
-                <a:solidFill>
-                  <a:srgbClr val="000000"/>
-                </a:solidFill>
-                <a:effectLst/>
-                <a:latin typeface="MeiryoKe_Console" panose="020B0609030504040204" pitchFamily="49" charset="-128"/>
-                <a:ea typeface="MeiryoKe_Console" panose="020B0609030504040204" pitchFamily="49" charset="-128"/>
-              </a:rPr>
-              <a:t>etc</a:t>
-            </a:r>
-            <a:r>
-              <a:rPr lang="en-US" altLang="ja-JP" sz="1400" b="1" i="0" u="sng" strike="noStrike" dirty="0">
-                <a:solidFill>
-                  <a:srgbClr val="000000"/>
-                </a:solidFill>
-                <a:effectLst/>
-                <a:latin typeface="MeiryoKe_Console" panose="020B0609030504040204" pitchFamily="49" charset="-128"/>
-                <a:ea typeface="MeiryoKe_Console" panose="020B0609030504040204" pitchFamily="49" charset="-128"/>
-              </a:rPr>
-              <a:t>/bind/</a:t>
-            </a:r>
-            <a:r>
-              <a:rPr lang="en-US" altLang="ja-JP" sz="1400" b="1" i="0" u="sng" strike="noStrike" dirty="0" err="1">
-                <a:solidFill>
-                  <a:srgbClr val="000000"/>
-                </a:solidFill>
-                <a:effectLst/>
-                <a:latin typeface="MeiryoKe_Console" panose="020B0609030504040204" pitchFamily="49" charset="-128"/>
-                <a:ea typeface="MeiryoKe_Console" panose="020B0609030504040204" pitchFamily="49" charset="-128"/>
-              </a:rPr>
-              <a:t>named.conf.options</a:t>
-            </a:r>
-            <a:endParaRPr lang="en-US" altLang="ja-JP" sz="1400" b="1" i="0" u="sng" strike="noStrike" dirty="0">
-              <a:solidFill>
-                <a:srgbClr val="000000"/>
-              </a:solidFill>
-              <a:effectLst/>
-              <a:latin typeface="MeiryoKe_Console" panose="020B0609030504040204" pitchFamily="49" charset="-128"/>
-              <a:ea typeface="MeiryoKe_Console" panose="020B0609030504040204" pitchFamily="49" charset="-128"/>
-            </a:endParaRPr>
-          </a:p>
-          <a:p>
-            <a:pPr rtl="0">
-              <a:spcBef>
-                <a:spcPts val="0"/>
-              </a:spcBef>
-              <a:spcAft>
-                <a:spcPts val="0"/>
-              </a:spcAft>
-            </a:pPr>
-            <a:r>
-              <a:rPr lang="en-US" altLang="ja-JP" sz="1400" b="0" i="0" u="none" strike="noStrike" dirty="0">
-                <a:solidFill>
-                  <a:srgbClr val="000000"/>
-                </a:solidFill>
-                <a:effectLst/>
-                <a:latin typeface="MeiryoKe_Console" panose="020B0609030504040204" pitchFamily="49" charset="-128"/>
-                <a:ea typeface="MeiryoKe_Console" panose="020B0609030504040204" pitchFamily="49" charset="-128"/>
-              </a:rPr>
-              <a:t>allow-query { 127.0.0.1;192.168.0.0/16; };</a:t>
-            </a:r>
-            <a:endParaRPr lang="en-US" altLang="ja-JP" sz="1400" b="0" dirty="0">
-              <a:effectLst/>
-              <a:latin typeface="MeiryoKe_Console" panose="020B0609030504040204" pitchFamily="49" charset="-128"/>
-              <a:ea typeface="MeiryoKe_Console" panose="020B0609030504040204" pitchFamily="49" charset="-128"/>
-            </a:endParaRPr>
-          </a:p>
-          <a:p>
-            <a:pPr rtl="0">
-              <a:spcBef>
-                <a:spcPts val="0"/>
-              </a:spcBef>
-              <a:spcAft>
-                <a:spcPts val="0"/>
-              </a:spcAft>
-            </a:pPr>
-            <a:r>
-              <a:rPr lang="en-US" altLang="ja-JP" sz="1400" b="0" i="0" u="none" strike="noStrike" dirty="0">
-                <a:solidFill>
-                  <a:srgbClr val="000000"/>
-                </a:solidFill>
-                <a:effectLst/>
-                <a:latin typeface="MeiryoKe_Console" panose="020B0609030504040204" pitchFamily="49" charset="-128"/>
-                <a:ea typeface="MeiryoKe_Console" panose="020B0609030504040204" pitchFamily="49" charset="-128"/>
-              </a:rPr>
-              <a:t>allow-query-cache { 127.0.0.1; 192.168.0.0/16; };</a:t>
-            </a:r>
-            <a:endParaRPr lang="en-US" altLang="ja-JP" sz="1400" b="0" dirty="0">
-              <a:effectLst/>
-              <a:latin typeface="MeiryoKe_Console" panose="020B0609030504040204" pitchFamily="49" charset="-128"/>
-              <a:ea typeface="MeiryoKe_Console" panose="020B0609030504040204" pitchFamily="49" charset="-128"/>
-            </a:endParaRPr>
-          </a:p>
-          <a:p>
-            <a:pPr rtl="0">
-              <a:spcBef>
-                <a:spcPts val="0"/>
-              </a:spcBef>
-              <a:spcAft>
-                <a:spcPts val="0"/>
-              </a:spcAft>
-            </a:pPr>
-            <a:r>
-              <a:rPr lang="en-US" altLang="ja-JP" sz="1400" b="0" i="0" u="none" strike="noStrike" dirty="0">
-                <a:solidFill>
-                  <a:srgbClr val="000000"/>
-                </a:solidFill>
-                <a:effectLst/>
-                <a:latin typeface="MeiryoKe_Console" panose="020B0609030504040204" pitchFamily="49" charset="-128"/>
-                <a:ea typeface="MeiryoKe_Console" panose="020B0609030504040204" pitchFamily="49" charset="-128"/>
-              </a:rPr>
-              <a:t>allow-update { 127.0.0.1; };</a:t>
-            </a:r>
-            <a:endParaRPr lang="en-US" altLang="ja-JP" sz="1400" b="0" dirty="0">
-              <a:effectLst/>
-              <a:latin typeface="MeiryoKe_Console" panose="020B0609030504040204" pitchFamily="49" charset="-128"/>
-              <a:ea typeface="MeiryoKe_Console" panose="020B0609030504040204" pitchFamily="49" charset="-128"/>
-            </a:endParaRPr>
-          </a:p>
-          <a:p>
-            <a:pPr rtl="0">
-              <a:spcBef>
-                <a:spcPts val="0"/>
-              </a:spcBef>
-              <a:spcAft>
-                <a:spcPts val="0"/>
-              </a:spcAft>
-            </a:pPr>
-            <a:r>
-              <a:rPr lang="en-US" altLang="ja-JP" sz="1400" b="0" i="0" u="none" strike="noStrike" dirty="0">
-                <a:solidFill>
-                  <a:srgbClr val="000000"/>
-                </a:solidFill>
-                <a:effectLst/>
-                <a:latin typeface="MeiryoKe_Console" panose="020B0609030504040204" pitchFamily="49" charset="-128"/>
-                <a:ea typeface="MeiryoKe_Console" panose="020B0609030504040204" pitchFamily="49" charset="-128"/>
-              </a:rPr>
-              <a:t>forwarders { 192.168.100.1; };</a:t>
-            </a:r>
-            <a:endParaRPr lang="en-US" altLang="ja-JP" sz="1400" b="0" dirty="0">
-              <a:effectLst/>
-              <a:latin typeface="MeiryoKe_Console" panose="020B0609030504040204" pitchFamily="49" charset="-128"/>
-              <a:ea typeface="MeiryoKe_Console" panose="020B0609030504040204" pitchFamily="49" charset="-128"/>
-            </a:endParaRPr>
-          </a:p>
-          <a:p>
-            <a:br>
+            <a:r>
               <a:rPr lang="en-US" altLang="ja-JP" sz="1400" dirty="0">
                 <a:latin typeface="MeiryoKe_Console" panose="020B0609030504040204" pitchFamily="49" charset="-128"/>
                 <a:ea typeface="MeiryoKe_Console" panose="020B0609030504040204" pitchFamily="49" charset="-128"/>
               </a:rPr>
-            </a:br>
-            <a:r>
-              <a:rPr lang="en-US" altLang="ja-JP" sz="1400" b="1" u="sng" dirty="0">
-                <a:latin typeface="MeiryoKe_Console" panose="020B0609030504040204" pitchFamily="49" charset="-128"/>
-                <a:ea typeface="MeiryoKe_Console" panose="020B0609030504040204" pitchFamily="49" charset="-128"/>
-              </a:rPr>
-              <a:t>$</a:t>
-            </a:r>
-            <a:r>
-              <a:rPr lang="ja-JP" altLang="en-US" sz="1400" b="1" u="sng" dirty="0">
-                <a:latin typeface="MeiryoKe_Console" panose="020B0609030504040204" pitchFamily="49" charset="-128"/>
-                <a:ea typeface="MeiryoKe_Console" panose="020B0609030504040204" pitchFamily="49" charset="-128"/>
-              </a:rPr>
-              <a:t> </a:t>
-            </a:r>
-            <a:r>
-              <a:rPr lang="en-US" altLang="ja-JP" sz="1400" b="1" u="sng" dirty="0">
-                <a:latin typeface="MeiryoKe_Console" panose="020B0609030504040204" pitchFamily="49" charset="-128"/>
-                <a:ea typeface="MeiryoKe_Console" panose="020B0609030504040204" pitchFamily="49" charset="-128"/>
-              </a:rPr>
-              <a:t>/</a:t>
-            </a:r>
-            <a:r>
-              <a:rPr lang="en-US" altLang="ja-JP" sz="1400" b="1" u="sng" dirty="0" err="1">
-                <a:latin typeface="MeiryoKe_Console" panose="020B0609030504040204" pitchFamily="49" charset="-128"/>
-                <a:ea typeface="MeiryoKe_Console" panose="020B0609030504040204" pitchFamily="49" charset="-128"/>
-              </a:rPr>
-              <a:t>etc</a:t>
-            </a:r>
-            <a:r>
-              <a:rPr lang="en-US" altLang="ja-JP" sz="1400" b="1" u="sng" dirty="0">
-                <a:latin typeface="MeiryoKe_Console" panose="020B0609030504040204" pitchFamily="49" charset="-128"/>
-                <a:ea typeface="MeiryoKe_Console" panose="020B0609030504040204" pitchFamily="49" charset="-128"/>
-              </a:rPr>
-              <a:t>/bind/</a:t>
-            </a:r>
-            <a:r>
-              <a:rPr lang="en-US" altLang="ja-JP" sz="1400" b="1" u="sng" dirty="0" err="1">
-                <a:latin typeface="MeiryoKe_Console" panose="020B0609030504040204" pitchFamily="49" charset="-128"/>
-                <a:ea typeface="MeiryoKe_Console" panose="020B0609030504040204" pitchFamily="49" charset="-128"/>
-              </a:rPr>
-              <a:t>named.conf</a:t>
-            </a:r>
-            <a:endParaRPr lang="en-US" altLang="ja-JP" sz="1400" b="1" u="sng" dirty="0">
-              <a:latin typeface="MeiryoKe_Console" panose="020B0609030504040204" pitchFamily="49" charset="-128"/>
-              <a:ea typeface="MeiryoKe_Console" panose="020B0609030504040204" pitchFamily="49" charset="-128"/>
-            </a:endParaRPr>
+              <a:t>subnet 192.168.10.16 netmask 255.255.255.240 {</a:t>
+            </a:r>
           </a:p>
           <a:p>
             <a:r>
@@ -4478,7 +4144,7 @@
                 <a:latin typeface="MeiryoKe_Console" panose="020B0609030504040204" pitchFamily="49" charset="-128"/>
                 <a:ea typeface="MeiryoKe_Console" panose="020B0609030504040204" pitchFamily="49" charset="-128"/>
               </a:rPr>
-              <a:t>zone "toshi.com" IN {</a:t>
+              <a:t> pool{</a:t>
             </a:r>
           </a:p>
           <a:p>
@@ -4487,7 +4153,7 @@
                 <a:latin typeface="MeiryoKe_Console" panose="020B0609030504040204" pitchFamily="49" charset="-128"/>
                 <a:ea typeface="MeiryoKe_Console" panose="020B0609030504040204" pitchFamily="49" charset="-128"/>
               </a:rPr>
-              <a:t> type master;</a:t>
+              <a:t>  option routers 192.168.10.30;</a:t>
             </a:r>
           </a:p>
           <a:p>
@@ -4496,21 +4162,107 @@
                 <a:latin typeface="MeiryoKe_Console" panose="020B0609030504040204" pitchFamily="49" charset="-128"/>
                 <a:ea typeface="MeiryoKe_Console" panose="020B0609030504040204" pitchFamily="49" charset="-128"/>
               </a:rPr>
-              <a:t> file "</a:t>
-            </a:r>
+              <a:t>  range 192.168.10.20 192.168.10.29;</a:t>
+            </a:r>
+          </a:p>
+          <a:p>
+            <a:r>
+              <a:rPr lang="en-US" altLang="ja-JP" sz="1400" dirty="0">
+                <a:latin typeface="MeiryoKe_Console" panose="020B0609030504040204" pitchFamily="49" charset="-128"/>
+                <a:ea typeface="MeiryoKe_Console" panose="020B0609030504040204" pitchFamily="49" charset="-128"/>
+              </a:rPr>
+              <a:t> }</a:t>
+            </a:r>
+          </a:p>
+          <a:p>
+            <a:r>
+              <a:rPr lang="en-US" altLang="ja-JP" sz="1400" dirty="0">
+                <a:latin typeface="MeiryoKe_Console" panose="020B0609030504040204" pitchFamily="49" charset="-128"/>
+                <a:ea typeface="MeiryoKe_Console" panose="020B0609030504040204" pitchFamily="49" charset="-128"/>
+              </a:rPr>
+              <a:t>}</a:t>
+            </a:r>
+          </a:p>
+          <a:p>
+            <a:endParaRPr lang="en-US" altLang="ja-JP" sz="1400" dirty="0">
+              <a:latin typeface="MeiryoKe_Console" panose="020B0609030504040204" pitchFamily="49" charset="-128"/>
+              <a:ea typeface="MeiryoKe_Console" panose="020B0609030504040204" pitchFamily="49" charset="-128"/>
+            </a:endParaRPr>
+          </a:p>
+          <a:p>
+            <a:r>
+              <a:rPr lang="en-US" altLang="ja-JP" sz="1400" dirty="0">
+                <a:latin typeface="MeiryoKe_Console" panose="020B0609030504040204" pitchFamily="49" charset="-128"/>
+                <a:ea typeface="MeiryoKe_Console" panose="020B0609030504040204" pitchFamily="49" charset="-128"/>
+              </a:rPr>
+              <a:t>subnet 192.168.20.32 netmask 255.255.255.248 {</a:t>
+            </a:r>
+          </a:p>
+          <a:p>
+            <a:r>
+              <a:rPr lang="en-US" altLang="ja-JP" sz="1400" dirty="0">
+                <a:latin typeface="MeiryoKe_Console" panose="020B0609030504040204" pitchFamily="49" charset="-128"/>
+                <a:ea typeface="MeiryoKe_Console" panose="020B0609030504040204" pitchFamily="49" charset="-128"/>
+              </a:rPr>
+              <a:t> pool{</a:t>
+            </a:r>
+          </a:p>
+          <a:p>
+            <a:r>
+              <a:rPr lang="en-US" altLang="ja-JP" sz="1400" dirty="0">
+                <a:latin typeface="MeiryoKe_Console" panose="020B0609030504040204" pitchFamily="49" charset="-128"/>
+                <a:ea typeface="MeiryoKe_Console" panose="020B0609030504040204" pitchFamily="49" charset="-128"/>
+              </a:rPr>
+              <a:t>  option routers 192.168.20.38;</a:t>
+            </a:r>
+          </a:p>
+          <a:p>
+            <a:r>
+              <a:rPr lang="en-US" altLang="ja-JP" sz="1400" dirty="0">
+                <a:latin typeface="MeiryoKe_Console" panose="020B0609030504040204" pitchFamily="49" charset="-128"/>
+                <a:ea typeface="MeiryoKe_Console" panose="020B0609030504040204" pitchFamily="49" charset="-128"/>
+              </a:rPr>
+              <a:t>  range 192.168.20.33 192.168.20.37;</a:t>
+            </a:r>
+          </a:p>
+          <a:p>
+            <a:r>
+              <a:rPr lang="en-US" altLang="ja-JP" sz="1400" dirty="0">
+                <a:latin typeface="MeiryoKe_Console" panose="020B0609030504040204" pitchFamily="49" charset="-128"/>
+                <a:ea typeface="MeiryoKe_Console" panose="020B0609030504040204" pitchFamily="49" charset="-128"/>
+              </a:rPr>
+              <a:t> }</a:t>
+            </a:r>
+          </a:p>
+          <a:p>
+            <a:r>
+              <a:rPr lang="en-US" altLang="ja-JP" sz="1400" dirty="0">
+                <a:latin typeface="MeiryoKe_Console" panose="020B0609030504040204" pitchFamily="49" charset="-128"/>
+                <a:ea typeface="MeiryoKe_Console" panose="020B0609030504040204" pitchFamily="49" charset="-128"/>
+              </a:rPr>
+              <a:t>}</a:t>
+            </a:r>
+          </a:p>
+          <a:p>
+            <a:endParaRPr lang="en-US" altLang="ja-JP" sz="1400" dirty="0">
+              <a:latin typeface="MeiryoKe_Console" panose="020B0609030504040204" pitchFamily="49" charset="-128"/>
+              <a:ea typeface="MeiryoKe_Console" panose="020B0609030504040204" pitchFamily="49" charset="-128"/>
+            </a:endParaRPr>
+          </a:p>
+          <a:p>
             <a:r>
               <a:rPr lang="en-US" altLang="ja-JP" sz="1400" dirty="0" err="1">
                 <a:latin typeface="MeiryoKe_Console" panose="020B0609030504040204" pitchFamily="49" charset="-128"/>
                 <a:ea typeface="MeiryoKe_Console" panose="020B0609030504040204" pitchFamily="49" charset="-128"/>
               </a:rPr>
-              <a:t>toshi.com.zone</a:t>
+              <a:t>ddns</a:t>
             </a:r>
             <a:r>
               <a:rPr lang="en-US" altLang="ja-JP" sz="1400" dirty="0">
                 <a:latin typeface="MeiryoKe_Console" panose="020B0609030504040204" pitchFamily="49" charset="-128"/>
                 <a:ea typeface="MeiryoKe_Console" panose="020B0609030504040204" pitchFamily="49" charset="-128"/>
               </a:rPr>
-              <a:t>";</a:t>
+              <a:t>-update-style interim;</a:t>
             </a:r>
           </a:p>
           <a:p>
@@ -4519,7 +4271,7 @@
                 <a:latin typeface="MeiryoKe_Console" panose="020B0609030504040204" pitchFamily="49" charset="-128"/>
                 <a:ea typeface="MeiryoKe_Console" panose="020B0609030504040204" pitchFamily="49" charset="-128"/>
               </a:rPr>
-              <a:t> notify no;</a:t>
+              <a:t>zone toshi.com. {</a:t>
             </a:r>
           </a:p>
           <a:p>
@@ -4528,7 +4280,7 @@
                 <a:latin typeface="MeiryoKe_Console" panose="020B0609030504040204" pitchFamily="49" charset="-128"/>
                 <a:ea typeface="MeiryoKe_Console" panose="020B0609030504040204" pitchFamily="49" charset="-128"/>
               </a:rPr>
-              <a:t>};	</a:t>
+              <a:t>primary 127.0.0.1;</a:t>
             </a:r>
           </a:p>
           <a:p>
@@ -4537,7 +4289,7 @@
                 <a:latin typeface="MeiryoKe_Console" panose="020B0609030504040204" pitchFamily="49" charset="-128"/>
                 <a:ea typeface="MeiryoKe_Console" panose="020B0609030504040204" pitchFamily="49" charset="-128"/>
               </a:rPr>
-              <a:t>zone "168.192.in-addr.arpa" IN {</a:t>
+              <a:t>}</a:t>
             </a:r>
           </a:p>
           <a:p>
@@ -4546,7 +4298,7 @@
                 <a:latin typeface="MeiryoKe_Console" panose="020B0609030504040204" pitchFamily="49" charset="-128"/>
                 <a:ea typeface="MeiryoKe_Console" panose="020B0609030504040204" pitchFamily="49" charset="-128"/>
               </a:rPr>
-              <a:t> type master;</a:t>
+              <a:t>zone 168.192.in-addr.arpa. {</a:t>
             </a:r>
           </a:p>
           <a:p>
@@ -4555,7 +4307,7 @@
                 <a:latin typeface="MeiryoKe_Console" panose="020B0609030504040204" pitchFamily="49" charset="-128"/>
                 <a:ea typeface="MeiryoKe_Console" panose="020B0609030504040204" pitchFamily="49" charset="-128"/>
               </a:rPr>
-              <a:t> file "168.192.zone";</a:t>
+              <a:t>primary 127.0.0.1;</a:t>
             </a:r>
           </a:p>
           <a:p>
@@ -4564,17 +4316,12 @@
                 <a:latin typeface="MeiryoKe_Console" panose="020B0609030504040204" pitchFamily="49" charset="-128"/>
                 <a:ea typeface="MeiryoKe_Console" panose="020B0609030504040204" pitchFamily="49" charset="-128"/>
               </a:rPr>
-              <a:t> notify no;</a:t>
-            </a:r>
-          </a:p>
-          <a:p>
-            <a:r>
-              <a:rPr lang="en-US" altLang="ja-JP" sz="1400" dirty="0">
-                <a:latin typeface="MeiryoKe_Console" panose="020B0609030504040204" pitchFamily="49" charset="-128"/>
-                <a:ea typeface="MeiryoKe_Console" panose="020B0609030504040204" pitchFamily="49" charset="-128"/>
-              </a:rPr>
-              <a:t>};</a:t>
-            </a:r>
+              <a:t>}</a:t>
+            </a:r>
+            <a:endParaRPr lang="ja-JP" altLang="en-US" sz="1400" dirty="0">
+              <a:latin typeface="MeiryoKe_Console" panose="020B0609030504040204" pitchFamily="49" charset="-128"/>
+              <a:ea typeface="MeiryoKe_Console" panose="020B0609030504040204" pitchFamily="49" charset="-128"/>
+            </a:endParaRPr>
           </a:p>
         </p:txBody>
       </p:sp>
@@ -4592,8 +4339,8 @@
         </p:nvSpPr>
         <p:spPr>
           <a:xfrm>
-            <a:off x="6185307" y="560715"/>
-            <a:ext cx="3446104" cy="923330"/>
+            <a:off x="5348039" y="576066"/>
+            <a:ext cx="3446104" cy="2862322"/>
           </a:xfrm>
           <a:prstGeom prst="rect">
             <a:avLst/>
@@ -4613,284 +4360,87 @@
           <a:p>
             <a:r>
               <a:rPr lang="en-US" altLang="ja-JP" dirty="0"/>
-              <a:t>Zone toshi.com</a:t>
-            </a:r>
-          </a:p>
-          <a:p>
+              <a:t>DHCP Range 01:</a:t>
+            </a:r>
+          </a:p>
+          <a:p>
+            <a:pPr marL="285750" indent="-285750">
+              <a:buFontTx/>
+              <a:buChar char="-"/>
+            </a:pPr>
             <a:r>
               <a:rPr lang="en-US" altLang="ja-JP" dirty="0"/>
-              <a:t>192.168.10.17</a:t>
-            </a:r>
-            <a:r>
-              <a:rPr lang="ja-JP" altLang="en-US" dirty="0"/>
-              <a:t> </a:t>
-            </a:r>
+              <a:t>NW: 192.168.10.16/28 </a:t>
+            </a:r>
+          </a:p>
+          <a:p>
+            <a:pPr marL="285750" indent="-285750">
+              <a:buFontTx/>
+              <a:buChar char="-"/>
+            </a:pPr>
             <a:r>
               <a:rPr lang="en-US" altLang="ja-JP" dirty="0"/>
-              <a:t>=</a:t>
-            </a:r>
-            <a:r>
-              <a:rPr lang="ja-JP" altLang="en-US" dirty="0"/>
-              <a:t> </a:t>
-            </a:r>
+              <a:t>DHCP Host: .20 - .29</a:t>
+            </a:r>
+          </a:p>
+          <a:p>
+            <a:pPr marL="285750" indent="-285750">
+              <a:buFontTx/>
+              <a:buChar char="-"/>
+            </a:pPr>
             <a:r>
               <a:rPr lang="en-US" altLang="ja-JP" dirty="0"/>
-              <a:t>linuxbean1</a:t>
-            </a:r>
+              <a:t>Default GW: 192.168.10.30</a:t>
+            </a:r>
+          </a:p>
+          <a:p>
+            <a:endParaRPr lang="en-US" altLang="ja-JP" dirty="0"/>
           </a:p>
           <a:p>
             <a:r>
               <a:rPr lang="en-US" altLang="ja-JP" dirty="0"/>
-              <a:t>192.168.10.18 = cento-server</a:t>
-            </a:r>
-          </a:p>
-        </p:txBody>
-      </p:sp>
-      <p:sp>
-        <p:nvSpPr>
-          <p:cNvPr id="9" name="テキスト ボックス 8">
-            <a:extLst>
-              <a:ext uri="{FF2B5EF4-FFF2-40B4-BE49-F238E27FC236}">
-                <a16:creationId xmlns:a16="http://schemas.microsoft.com/office/drawing/2014/main" id="{D41FFEA2-5486-44B5-B39B-4023A62B032C}"/>
-              </a:ext>
-            </a:extLst>
-          </p:cNvPr>
-          <p:cNvSpPr txBox="1"/>
-          <p:nvPr/>
-        </p:nvSpPr>
-        <p:spPr>
-          <a:xfrm>
-            <a:off x="5748793" y="1582384"/>
-            <a:ext cx="5621572" cy="3539430"/>
-          </a:xfrm>
-          <a:prstGeom prst="rect">
-            <a:avLst/>
-          </a:prstGeom>
-          <a:noFill/>
-        </p:spPr>
-        <p:txBody>
-          <a:bodyPr wrap="square">
-            <a:spAutoFit/>
-          </a:bodyPr>
-          <a:lstStyle/>
-          <a:p>
-            <a:r>
-              <a:rPr lang="en-US" altLang="ja-JP" sz="1400" b="1" u="sng" dirty="0">
-                <a:latin typeface="MeiryoKe_Console" panose="020B0609030504040204" pitchFamily="49" charset="-128"/>
-                <a:ea typeface="MeiryoKe_Console" panose="020B0609030504040204" pitchFamily="49" charset="-128"/>
-              </a:rPr>
-              <a:t>$ /var/cache/bind/</a:t>
-            </a:r>
-            <a:r>
-              <a:rPr lang="en-US" altLang="ja-JP" sz="1400" b="1" u="sng" dirty="0" err="1">
-                <a:latin typeface="MeiryoKe_Console" panose="020B0609030504040204" pitchFamily="49" charset="-128"/>
-                <a:ea typeface="MeiryoKe_Console" panose="020B0609030504040204" pitchFamily="49" charset="-128"/>
-              </a:rPr>
-              <a:t>toshi.com.zone</a:t>
-            </a:r>
-            <a:endParaRPr lang="en-US" altLang="ja-JP" sz="1400" b="1" u="sng" dirty="0">
-              <a:latin typeface="MeiryoKe_Console" panose="020B0609030504040204" pitchFamily="49" charset="-128"/>
-              <a:ea typeface="MeiryoKe_Console" panose="020B0609030504040204" pitchFamily="49" charset="-128"/>
-            </a:endParaRPr>
-          </a:p>
-          <a:p>
-            <a:r>
-              <a:rPr lang="en-US" altLang="ja-JP" sz="1400" dirty="0">
-                <a:latin typeface="MeiryoKe_Console" panose="020B0609030504040204" pitchFamily="49" charset="-128"/>
-                <a:ea typeface="MeiryoKe_Console" panose="020B0609030504040204" pitchFamily="49" charset="-128"/>
-              </a:rPr>
-              <a:t>@ IN SOA linuxbean1.toshi.com. root.toshi.com. (</a:t>
-            </a:r>
-          </a:p>
-          <a:p>
-            <a:r>
-              <a:rPr lang="en-US" altLang="ja-JP" sz="1400" dirty="0">
-                <a:latin typeface="MeiryoKe_Console" panose="020B0609030504040204" pitchFamily="49" charset="-128"/>
-                <a:ea typeface="MeiryoKe_Console" panose="020B0609030504040204" pitchFamily="49" charset="-128"/>
-              </a:rPr>
-              <a:t>	      IN      NS      linuxbean1.toshi.com.</a:t>
-            </a:r>
-          </a:p>
-          <a:p>
-            <a:r>
-              <a:rPr lang="en-US" altLang="ja-JP" sz="1400" dirty="0">
-                <a:latin typeface="MeiryoKe_Console" panose="020B0609030504040204" pitchFamily="49" charset="-128"/>
-                <a:ea typeface="MeiryoKe_Console" panose="020B0609030504040204" pitchFamily="49" charset="-128"/>
-              </a:rPr>
-              <a:t>                IN      NS      centos-server.toshi.com.</a:t>
-            </a:r>
-          </a:p>
-          <a:p>
-            <a:r>
-              <a:rPr lang="en-US" altLang="ja-JP" sz="1400" dirty="0">
-                <a:latin typeface="MeiryoKe_Console" panose="020B0609030504040204" pitchFamily="49" charset="-128"/>
-                <a:ea typeface="MeiryoKe_Console" panose="020B0609030504040204" pitchFamily="49" charset="-128"/>
-              </a:rPr>
-              <a:t>                IN      NS      </a:t>
-            </a:r>
-            <a:r>
-              <a:rPr lang="en-US" altLang="ja-JP" sz="1400" dirty="0" err="1">
-                <a:latin typeface="MeiryoKe_Console" panose="020B0609030504040204" pitchFamily="49" charset="-128"/>
-                <a:ea typeface="MeiryoKe_Console" panose="020B0609030504040204" pitchFamily="49" charset="-128"/>
-              </a:rPr>
-              <a:t>speedwifi.home</a:t>
-            </a:r>
-            <a:r>
-              <a:rPr lang="en-US" altLang="ja-JP" sz="1400" dirty="0">
-                <a:latin typeface="MeiryoKe_Console" panose="020B0609030504040204" pitchFamily="49" charset="-128"/>
-                <a:ea typeface="MeiryoKe_Console" panose="020B0609030504040204" pitchFamily="49" charset="-128"/>
-              </a:rPr>
-              <a:t>.</a:t>
-            </a:r>
-          </a:p>
-          <a:p>
-            <a:r>
-              <a:rPr lang="en-US" altLang="ja-JP" sz="1400" dirty="0">
-                <a:latin typeface="MeiryoKe_Console" panose="020B0609030504040204" pitchFamily="49" charset="-128"/>
-                <a:ea typeface="MeiryoKe_Console" panose="020B0609030504040204" pitchFamily="49" charset="-128"/>
-              </a:rPr>
-              <a:t>                IN      NS      </a:t>
-            </a:r>
-            <a:r>
-              <a:rPr lang="en-US" altLang="ja-JP" sz="1400" dirty="0" err="1">
-                <a:latin typeface="MeiryoKe_Console" panose="020B0609030504040204" pitchFamily="49" charset="-128"/>
-                <a:ea typeface="MeiryoKe_Console" panose="020B0609030504040204" pitchFamily="49" charset="-128"/>
-              </a:rPr>
-              <a:t>toshi.oppo</a:t>
-            </a:r>
-            <a:r>
-              <a:rPr lang="en-US" altLang="ja-JP" sz="1400" dirty="0">
-                <a:latin typeface="MeiryoKe_Console" panose="020B0609030504040204" pitchFamily="49" charset="-128"/>
-                <a:ea typeface="MeiryoKe_Console" panose="020B0609030504040204" pitchFamily="49" charset="-128"/>
-              </a:rPr>
-              <a:t>.</a:t>
-            </a:r>
-          </a:p>
-          <a:p>
-            <a:r>
-              <a:rPr lang="en-US" altLang="ja-JP" sz="1400" dirty="0">
-                <a:latin typeface="MeiryoKe_Console" panose="020B0609030504040204" pitchFamily="49" charset="-128"/>
-                <a:ea typeface="MeiryoKe_Console" panose="020B0609030504040204" pitchFamily="49" charset="-128"/>
-              </a:rPr>
-              <a:t>linuxbean1 	IN 	A 	192.168.10.17</a:t>
-            </a:r>
-          </a:p>
-          <a:p>
-            <a:r>
-              <a:rPr lang="en-US" altLang="ja-JP" sz="1400" dirty="0">
-                <a:latin typeface="MeiryoKe_Console" panose="020B0609030504040204" pitchFamily="49" charset="-128"/>
-                <a:ea typeface="MeiryoKe_Console" panose="020B0609030504040204" pitchFamily="49" charset="-128"/>
-              </a:rPr>
-              <a:t>centos-server	IN	A	192.168.10.18</a:t>
-            </a:r>
-          </a:p>
-          <a:p>
-            <a:endParaRPr lang="en-US" altLang="ja-JP" sz="1400" dirty="0">
-              <a:latin typeface="MeiryoKe_Console" panose="020B0609030504040204" pitchFamily="49" charset="-128"/>
-              <a:ea typeface="MeiryoKe_Console" panose="020B0609030504040204" pitchFamily="49" charset="-128"/>
-            </a:endParaRPr>
-          </a:p>
-          <a:p>
-            <a:r>
-              <a:rPr lang="it-IT" altLang="ja-JP" sz="1400" b="1" u="sng" dirty="0">
-                <a:latin typeface="MeiryoKe_Console" panose="020B0609030504040204" pitchFamily="49" charset="-128"/>
-                <a:ea typeface="MeiryoKe_Console" panose="020B0609030504040204" pitchFamily="49" charset="-128"/>
-              </a:rPr>
-              <a:t>$ /var/cache/bind/168.192.zone</a:t>
-            </a:r>
-          </a:p>
-          <a:p>
-            <a:r>
-              <a:rPr lang="en-US" altLang="ja-JP" sz="1400" dirty="0">
-                <a:latin typeface="MeiryoKe_Console" panose="020B0609030504040204" pitchFamily="49" charset="-128"/>
-                <a:ea typeface="MeiryoKe_Console" panose="020B0609030504040204" pitchFamily="49" charset="-128"/>
-              </a:rPr>
-              <a:t>	IN 	NS 	linuxbean1.toshi.com.</a:t>
-            </a:r>
-          </a:p>
-          <a:p>
-            <a:r>
-              <a:rPr lang="en-US" altLang="ja-JP" sz="1400" dirty="0">
-                <a:latin typeface="MeiryoKe_Console" panose="020B0609030504040204" pitchFamily="49" charset="-128"/>
-                <a:ea typeface="MeiryoKe_Console" panose="020B0609030504040204" pitchFamily="49" charset="-128"/>
-              </a:rPr>
-              <a:t>	IN	NS	centos-server.toshi.com.</a:t>
-            </a:r>
-          </a:p>
-          <a:p>
-            <a:r>
-              <a:rPr lang="en-US" altLang="ja-JP" sz="1400" dirty="0">
-                <a:latin typeface="MeiryoKe_Console" panose="020B0609030504040204" pitchFamily="49" charset="-128"/>
-                <a:ea typeface="MeiryoKe_Console" panose="020B0609030504040204" pitchFamily="49" charset="-128"/>
-              </a:rPr>
-              <a:t>	IN	NS	</a:t>
-            </a:r>
-            <a:r>
-              <a:rPr lang="en-US" altLang="ja-JP" sz="1400" dirty="0" err="1">
-                <a:latin typeface="MeiryoKe_Console" panose="020B0609030504040204" pitchFamily="49" charset="-128"/>
-                <a:ea typeface="MeiryoKe_Console" panose="020B0609030504040204" pitchFamily="49" charset="-128"/>
-              </a:rPr>
-              <a:t>speedwifi.home</a:t>
-            </a:r>
-            <a:r>
-              <a:rPr lang="en-US" altLang="ja-JP" sz="1400" dirty="0">
-                <a:latin typeface="MeiryoKe_Console" panose="020B0609030504040204" pitchFamily="49" charset="-128"/>
-                <a:ea typeface="MeiryoKe_Console" panose="020B0609030504040204" pitchFamily="49" charset="-128"/>
-              </a:rPr>
-              <a:t>.</a:t>
-            </a:r>
-          </a:p>
-          <a:p>
-            <a:r>
-              <a:rPr lang="en-US" altLang="ja-JP" sz="1400" dirty="0">
-                <a:latin typeface="MeiryoKe_Console" panose="020B0609030504040204" pitchFamily="49" charset="-128"/>
-                <a:ea typeface="MeiryoKe_Console" panose="020B0609030504040204" pitchFamily="49" charset="-128"/>
-              </a:rPr>
-              <a:t>	IN	NS	</a:t>
-            </a:r>
-            <a:r>
-              <a:rPr lang="en-US" altLang="ja-JP" sz="1400" dirty="0" err="1">
-                <a:latin typeface="MeiryoKe_Console" panose="020B0609030504040204" pitchFamily="49" charset="-128"/>
-                <a:ea typeface="MeiryoKe_Console" panose="020B0609030504040204" pitchFamily="49" charset="-128"/>
-              </a:rPr>
-              <a:t>toshi.oppo</a:t>
-            </a:r>
-            <a:r>
-              <a:rPr lang="en-US" altLang="ja-JP" sz="1400" dirty="0">
-                <a:latin typeface="MeiryoKe_Console" panose="020B0609030504040204" pitchFamily="49" charset="-128"/>
-                <a:ea typeface="MeiryoKe_Console" panose="020B0609030504040204" pitchFamily="49" charset="-128"/>
-              </a:rPr>
-              <a:t>.</a:t>
-            </a:r>
-          </a:p>
-          <a:p>
-            <a:r>
-              <a:rPr lang="en-US" altLang="ja-JP" sz="1400" dirty="0">
-                <a:latin typeface="MeiryoKe_Console" panose="020B0609030504040204" pitchFamily="49" charset="-128"/>
-                <a:ea typeface="MeiryoKe_Console" panose="020B0609030504040204" pitchFamily="49" charset="-128"/>
-              </a:rPr>
-              <a:t>17.10 	IN 	PTR 	linuxbean1.toshi.com.</a:t>
-            </a:r>
-          </a:p>
-          <a:p>
-            <a:r>
-              <a:rPr lang="pt-BR" altLang="ja-JP" sz="1400" dirty="0">
-                <a:latin typeface="MeiryoKe_Console" panose="020B0609030504040204" pitchFamily="49" charset="-128"/>
-                <a:ea typeface="MeiryoKe_Console" panose="020B0609030504040204" pitchFamily="49" charset="-128"/>
-              </a:rPr>
-              <a:t>18.10	IN	PTR	centos-server.toshi.com.</a:t>
-            </a:r>
-            <a:endParaRPr lang="en-US" altLang="ja-JP" sz="1400" dirty="0">
-              <a:latin typeface="MeiryoKe_Console" panose="020B0609030504040204" pitchFamily="49" charset="-128"/>
-              <a:ea typeface="MeiryoKe_Console" panose="020B0609030504040204" pitchFamily="49" charset="-128"/>
-            </a:endParaRPr>
+              <a:t>DHCP Range 02:</a:t>
+            </a:r>
+          </a:p>
+          <a:p>
+            <a:pPr marL="285750" indent="-285750">
+              <a:buFontTx/>
+              <a:buChar char="-"/>
+            </a:pPr>
+            <a:r>
+              <a:rPr lang="en-US" altLang="ja-JP" dirty="0"/>
+              <a:t>NW: 192.168.20.32/29 </a:t>
+            </a:r>
+          </a:p>
+          <a:p>
+            <a:pPr marL="285750" indent="-285750">
+              <a:buFontTx/>
+              <a:buChar char="-"/>
+            </a:pPr>
+            <a:r>
+              <a:rPr lang="en-US" altLang="ja-JP" dirty="0"/>
+              <a:t>DHCP Host: .33 - .37</a:t>
+            </a:r>
+          </a:p>
+          <a:p>
+            <a:pPr marL="285750" indent="-285750">
+              <a:buFontTx/>
+              <a:buChar char="-"/>
+            </a:pPr>
+            <a:r>
+              <a:rPr lang="en-US" altLang="ja-JP" dirty="0"/>
+              <a:t>Default GW: 192.168.10.38</a:t>
+            </a:r>
+          </a:p>
+          <a:p>
+            <a:endParaRPr lang="ja-JP" altLang="en-US" dirty="0"/>
           </a:p>
         </p:txBody>
       </p:sp>
     </p:spTree>
     <p:extLst>
       <p:ext uri="{BB962C8B-B14F-4D97-AF65-F5344CB8AC3E}">
-        <p14:creationId xmlns:p14="http://schemas.microsoft.com/office/powerpoint/2010/main" val="4043853895"/>
+        <p14:creationId xmlns:p14="http://schemas.microsoft.com/office/powerpoint/2010/main" val="1823354145"/>
       </p:ext>
     </p:extLst>
   </p:cSld>
@@ -4922,7 +4472,7 @@
           <p:cNvPr id="3" name="テキスト ボックス 2">
             <a:extLst>
               <a:ext uri="{FF2B5EF4-FFF2-40B4-BE49-F238E27FC236}">
-                <a16:creationId xmlns:a16="http://schemas.microsoft.com/office/drawing/2014/main" id="{4C21324B-73FE-427F-BBC9-0DD00CA0AA9B}"/>
+                <a16:creationId xmlns:a16="http://schemas.microsoft.com/office/drawing/2014/main" id="{DEA60B48-225B-4F53-8266-1BB4FDA18E28}"/>
               </a:ext>
             </a:extLst>
           </p:cNvPr>
@@ -4932,7 +4482,7 @@
         <p:spPr>
           <a:xfrm>
             <a:off x="127221" y="206734"/>
-            <a:ext cx="1763624" cy="369332"/>
+            <a:ext cx="2010487" cy="369332"/>
           </a:xfrm>
           <a:prstGeom prst="rect">
             <a:avLst/>
@@ -4946,147 +4496,376 @@
           <a:lstStyle/>
           <a:p>
             <a:r>
-              <a:rPr lang="en-US" altLang="ja-JP" b="1" u="sng" dirty="0"/>
-              <a:t>Oct</a:t>
-            </a:r>
-            <a:r>
               <a:rPr kumimoji="1" lang="en-US" altLang="ja-JP" b="1" u="sng" dirty="0"/>
-              <a:t>. 14</a:t>
-            </a:r>
-            <a:r>
-              <a:rPr kumimoji="1" lang="en-US" altLang="ja-JP" b="1" u="sng" baseline="30000" dirty="0"/>
-              <a:t>th</a:t>
-            </a:r>
-            <a:r>
-              <a:rPr kumimoji="1" lang="en-US" altLang="ja-JP" b="1" u="sng" dirty="0"/>
-              <a:t>, 2020</a:t>
+              <a:t>DNS - </a:t>
+            </a:r>
+            <a:r>
+              <a:rPr kumimoji="1" lang="en-US" altLang="ja-JP" b="1" u="sng" dirty="0" err="1"/>
+              <a:t>Linuxbean</a:t>
             </a:r>
             <a:endParaRPr kumimoji="1" lang="ja-JP" altLang="en-US" b="1" u="sng" dirty="0"/>
           </a:p>
         </p:txBody>
       </p:sp>
-      <p:pic>
-        <p:nvPicPr>
-          <p:cNvPr id="2" name="図 1">
-            <a:extLst>
-              <a:ext uri="{FF2B5EF4-FFF2-40B4-BE49-F238E27FC236}">
-                <a16:creationId xmlns:a16="http://schemas.microsoft.com/office/drawing/2014/main" id="{A6FD1B4C-F305-4268-A9AC-61B13A782DF0}"/>
-              </a:ext>
-            </a:extLst>
-          </p:cNvPr>
-          <p:cNvPicPr>
-            <a:picLocks noChangeAspect="1"/>
-          </p:cNvPicPr>
+      <p:sp>
+        <p:nvSpPr>
+          <p:cNvPr id="7" name="テキスト ボックス 6">
+            <a:extLst>
+              <a:ext uri="{FF2B5EF4-FFF2-40B4-BE49-F238E27FC236}">
+                <a16:creationId xmlns:a16="http://schemas.microsoft.com/office/drawing/2014/main" id="{7FC0C65A-AEF7-44DD-BF95-A63EF7E133F6}"/>
+              </a:ext>
+            </a:extLst>
+          </p:cNvPr>
+          <p:cNvSpPr txBox="1"/>
           <p:nvPr/>
-        </p:nvPicPr>
-        <p:blipFill>
-          <a:blip r:embed="rId2"/>
-          <a:stretch>
-            <a:fillRect/>
-          </a:stretch>
-        </p:blipFill>
+        </p:nvSpPr>
         <p:spPr>
           <a:xfrm>
-            <a:off x="1089329" y="576066"/>
-            <a:ext cx="10448014" cy="6109648"/>
-          </a:xfrm>
-          <a:prstGeom prst="rect">
-            <a:avLst/>
-          </a:prstGeom>
-        </p:spPr>
-      </p:pic>
-      <p:pic>
-        <p:nvPicPr>
-          <p:cNvPr id="6" name="Picture 20" descr="C:\Users\ecoffey\AppData\Local\Temp\Rar$DRa0.832\30100_Device_voice_router_unknown_64.png">
-            <a:extLst>
-              <a:ext uri="{FF2B5EF4-FFF2-40B4-BE49-F238E27FC236}">
-                <a16:creationId xmlns:a16="http://schemas.microsoft.com/office/drawing/2014/main" id="{36709E00-ECED-47DC-BDF9-E18F1F8092D7}"/>
-              </a:ext>
-            </a:extLst>
-          </p:cNvPr>
-          <p:cNvPicPr>
-            <a:picLocks noChangeAspect="1" noChangeArrowheads="1"/>
-          </p:cNvPicPr>
-          <p:nvPr/>
-        </p:nvPicPr>
-        <p:blipFill>
-          <a:blip r:embed="rId3">
-            <a:extLst>
-              <a:ext uri="{28A0092B-C50C-407E-A947-70E740481C1C}">
-                <a14:useLocalDpi xmlns:a14="http://schemas.microsoft.com/office/drawing/2010/main" val="0"/>
-              </a:ext>
-            </a:extLst>
-          </a:blip>
-          <a:srcRect/>
-          <a:stretch>
-            <a:fillRect/>
-          </a:stretch>
-        </p:blipFill>
-        <p:spPr bwMode="auto">
-          <a:xfrm>
-            <a:off x="10278831" y="1005781"/>
-            <a:ext cx="757580" cy="757580"/>
+            <a:off x="127221" y="576066"/>
+            <a:ext cx="5621572" cy="3754874"/>
           </a:xfrm>
           <a:prstGeom prst="rect">
             <a:avLst/>
           </a:prstGeom>
           <a:noFill/>
-          <a:extLst>
-            <a:ext uri="{909E8E84-426E-40DD-AFC4-6F175D3DCCD1}">
-              <a14:hiddenFill xmlns:a14="http://schemas.microsoft.com/office/drawing/2010/main">
-                <a:solidFill>
-                  <a:srgbClr val="FFFFFF"/>
-                </a:solidFill>
-              </a14:hiddenFill>
-            </a:ext>
-          </a:extLst>
-        </p:spPr>
-      </p:pic>
-      <p:cxnSp>
-        <p:nvCxnSpPr>
-          <p:cNvPr id="8" name="直線コネクタ 7">
-            <a:extLst>
-              <a:ext uri="{FF2B5EF4-FFF2-40B4-BE49-F238E27FC236}">
-                <a16:creationId xmlns:a16="http://schemas.microsoft.com/office/drawing/2014/main" id="{462070E5-5E00-4567-9A29-6FEDBA6B0EB5}"/>
-              </a:ext>
-            </a:extLst>
-          </p:cNvPr>
-          <p:cNvCxnSpPr>
-            <a:cxnSpLocks/>
-          </p:cNvCxnSpPr>
-          <p:nvPr/>
-        </p:nvCxnSpPr>
-        <p:spPr>
-          <a:xfrm>
-            <a:off x="9748299" y="1375577"/>
-            <a:ext cx="530532" cy="0"/>
-          </a:xfrm>
-          <a:prstGeom prst="line">
-            <a:avLst/>
-          </a:prstGeom>
-          <a:ln w="28575"/>
-        </p:spPr>
-        <p:style>
-          <a:lnRef idx="1">
-            <a:schemeClr val="accent1"/>
-          </a:lnRef>
-          <a:fillRef idx="0">
-            <a:schemeClr val="accent1"/>
-          </a:fillRef>
-          <a:effectRef idx="0">
-            <a:schemeClr val="accent1"/>
-          </a:effectRef>
-          <a:fontRef idx="minor">
-            <a:schemeClr val="tx1"/>
-          </a:fontRef>
-        </p:style>
-      </p:cxnSp>
+        </p:spPr>
+        <p:txBody>
+          <a:bodyPr wrap="square">
+            <a:spAutoFit/>
+          </a:bodyPr>
+          <a:lstStyle/>
+          <a:p>
+            <a:pPr rtl="0">
+              <a:spcBef>
+                <a:spcPts val="0"/>
+              </a:spcBef>
+              <a:spcAft>
+                <a:spcPts val="0"/>
+              </a:spcAft>
+            </a:pPr>
+            <a:r>
+              <a:rPr lang="en-US" altLang="ja-JP" sz="1400" b="1" i="0" u="sng" strike="noStrike" dirty="0">
+                <a:solidFill>
+                  <a:srgbClr val="000000"/>
+                </a:solidFill>
+                <a:effectLst/>
+                <a:latin typeface="MeiryoKe_Console" panose="020B0609030504040204" pitchFamily="49" charset="-128"/>
+                <a:ea typeface="MeiryoKe_Console" panose="020B0609030504040204" pitchFamily="49" charset="-128"/>
+              </a:rPr>
+              <a:t>$ /</a:t>
+            </a:r>
+            <a:r>
+              <a:rPr lang="en-US" altLang="ja-JP" sz="1400" b="1" i="0" u="sng" strike="noStrike" dirty="0" err="1">
+                <a:solidFill>
+                  <a:srgbClr val="000000"/>
+                </a:solidFill>
+                <a:effectLst/>
+                <a:latin typeface="MeiryoKe_Console" panose="020B0609030504040204" pitchFamily="49" charset="-128"/>
+                <a:ea typeface="MeiryoKe_Console" panose="020B0609030504040204" pitchFamily="49" charset="-128"/>
+              </a:rPr>
+              <a:t>etc</a:t>
+            </a:r>
+            <a:r>
+              <a:rPr lang="en-US" altLang="ja-JP" sz="1400" b="1" i="0" u="sng" strike="noStrike" dirty="0">
+                <a:solidFill>
+                  <a:srgbClr val="000000"/>
+                </a:solidFill>
+                <a:effectLst/>
+                <a:latin typeface="MeiryoKe_Console" panose="020B0609030504040204" pitchFamily="49" charset="-128"/>
+                <a:ea typeface="MeiryoKe_Console" panose="020B0609030504040204" pitchFamily="49" charset="-128"/>
+              </a:rPr>
+              <a:t>/bind/</a:t>
+            </a:r>
+            <a:r>
+              <a:rPr lang="en-US" altLang="ja-JP" sz="1400" b="1" i="0" u="sng" strike="noStrike" dirty="0" err="1">
+                <a:solidFill>
+                  <a:srgbClr val="000000"/>
+                </a:solidFill>
+                <a:effectLst/>
+                <a:latin typeface="MeiryoKe_Console" panose="020B0609030504040204" pitchFamily="49" charset="-128"/>
+                <a:ea typeface="MeiryoKe_Console" panose="020B0609030504040204" pitchFamily="49" charset="-128"/>
+              </a:rPr>
+              <a:t>named.conf.options</a:t>
+            </a:r>
+            <a:endParaRPr lang="en-US" altLang="ja-JP" sz="1400" b="1" i="0" u="sng" strike="noStrike" dirty="0">
+              <a:solidFill>
+                <a:srgbClr val="000000"/>
+              </a:solidFill>
+              <a:effectLst/>
+              <a:latin typeface="MeiryoKe_Console" panose="020B0609030504040204" pitchFamily="49" charset="-128"/>
+              <a:ea typeface="MeiryoKe_Console" panose="020B0609030504040204" pitchFamily="49" charset="-128"/>
+            </a:endParaRPr>
+          </a:p>
+          <a:p>
+            <a:pPr rtl="0">
+              <a:spcBef>
+                <a:spcPts val="0"/>
+              </a:spcBef>
+              <a:spcAft>
+                <a:spcPts val="0"/>
+              </a:spcAft>
+            </a:pPr>
+            <a:r>
+              <a:rPr lang="en-US" altLang="ja-JP" sz="1400" b="0" i="0" u="none" strike="noStrike" dirty="0">
+                <a:solidFill>
+                  <a:srgbClr val="000000"/>
+                </a:solidFill>
+                <a:effectLst/>
+                <a:latin typeface="MeiryoKe_Console" panose="020B0609030504040204" pitchFamily="49" charset="-128"/>
+                <a:ea typeface="MeiryoKe_Console" panose="020B0609030504040204" pitchFamily="49" charset="-128"/>
+              </a:rPr>
+              <a:t>allow-query { 127.0.0.1;192.168.0.0/16; };</a:t>
+            </a:r>
+            <a:endParaRPr lang="en-US" altLang="ja-JP" sz="1400" b="0" dirty="0">
+              <a:effectLst/>
+              <a:latin typeface="MeiryoKe_Console" panose="020B0609030504040204" pitchFamily="49" charset="-128"/>
+              <a:ea typeface="MeiryoKe_Console" panose="020B0609030504040204" pitchFamily="49" charset="-128"/>
+            </a:endParaRPr>
+          </a:p>
+          <a:p>
+            <a:pPr rtl="0">
+              <a:spcBef>
+                <a:spcPts val="0"/>
+              </a:spcBef>
+              <a:spcAft>
+                <a:spcPts val="0"/>
+              </a:spcAft>
+            </a:pPr>
+            <a:r>
+              <a:rPr lang="en-US" altLang="ja-JP" sz="1400" b="0" i="0" u="none" strike="noStrike" dirty="0">
+                <a:solidFill>
+                  <a:srgbClr val="000000"/>
+                </a:solidFill>
+                <a:effectLst/>
+                <a:latin typeface="MeiryoKe_Console" panose="020B0609030504040204" pitchFamily="49" charset="-128"/>
+                <a:ea typeface="MeiryoKe_Console" panose="020B0609030504040204" pitchFamily="49" charset="-128"/>
+              </a:rPr>
+              <a:t>allow-query-cache { 127.0.0.1; 192.168.0.0/16; };</a:t>
+            </a:r>
+            <a:endParaRPr lang="en-US" altLang="ja-JP" sz="1400" b="0" dirty="0">
+              <a:effectLst/>
+              <a:latin typeface="MeiryoKe_Console" panose="020B0609030504040204" pitchFamily="49" charset="-128"/>
+              <a:ea typeface="MeiryoKe_Console" panose="020B0609030504040204" pitchFamily="49" charset="-128"/>
+            </a:endParaRPr>
+          </a:p>
+          <a:p>
+            <a:pPr rtl="0">
+              <a:spcBef>
+                <a:spcPts val="0"/>
+              </a:spcBef>
+              <a:spcAft>
+                <a:spcPts val="0"/>
+              </a:spcAft>
+            </a:pPr>
+            <a:r>
+              <a:rPr lang="en-US" altLang="ja-JP" sz="1400" b="0" i="0" u="none" strike="noStrike" dirty="0">
+                <a:solidFill>
+                  <a:srgbClr val="000000"/>
+                </a:solidFill>
+                <a:effectLst/>
+                <a:latin typeface="MeiryoKe_Console" panose="020B0609030504040204" pitchFamily="49" charset="-128"/>
+                <a:ea typeface="MeiryoKe_Console" panose="020B0609030504040204" pitchFamily="49" charset="-128"/>
+              </a:rPr>
+              <a:t>allow-update { 127.0.0.1; };</a:t>
+            </a:r>
+            <a:endParaRPr lang="en-US" altLang="ja-JP" sz="1400" b="0" dirty="0">
+              <a:effectLst/>
+              <a:latin typeface="MeiryoKe_Console" panose="020B0609030504040204" pitchFamily="49" charset="-128"/>
+              <a:ea typeface="MeiryoKe_Console" panose="020B0609030504040204" pitchFamily="49" charset="-128"/>
+            </a:endParaRPr>
+          </a:p>
+          <a:p>
+            <a:pPr rtl="0">
+              <a:spcBef>
+                <a:spcPts val="0"/>
+              </a:spcBef>
+              <a:spcAft>
+                <a:spcPts val="0"/>
+              </a:spcAft>
+            </a:pPr>
+            <a:r>
+              <a:rPr lang="en-US" altLang="ja-JP" sz="1400" b="0" i="0" u="none" strike="noStrike" dirty="0">
+                <a:solidFill>
+                  <a:srgbClr val="000000"/>
+                </a:solidFill>
+                <a:effectLst/>
+                <a:latin typeface="MeiryoKe_Console" panose="020B0609030504040204" pitchFamily="49" charset="-128"/>
+                <a:ea typeface="MeiryoKe_Console" panose="020B0609030504040204" pitchFamily="49" charset="-128"/>
+              </a:rPr>
+              <a:t>forwarders { 192.168.100.1; };</a:t>
+            </a:r>
+            <a:endParaRPr lang="en-US" altLang="ja-JP" sz="1400" b="0" dirty="0">
+              <a:effectLst/>
+              <a:latin typeface="MeiryoKe_Console" panose="020B0609030504040204" pitchFamily="49" charset="-128"/>
+              <a:ea typeface="MeiryoKe_Console" panose="020B0609030504040204" pitchFamily="49" charset="-128"/>
+            </a:endParaRPr>
+          </a:p>
+          <a:p>
+            <a:br>
+              <a:rPr lang="en-US" altLang="ja-JP" sz="1400" dirty="0">
+                <a:latin typeface="MeiryoKe_Console" panose="020B0609030504040204" pitchFamily="49" charset="-128"/>
+                <a:ea typeface="MeiryoKe_Console" panose="020B0609030504040204" pitchFamily="49" charset="-128"/>
+              </a:rPr>
+            </a:br>
+            <a:r>
+              <a:rPr lang="en-US" altLang="ja-JP" sz="1400" b="1" u="sng" dirty="0">
+                <a:latin typeface="MeiryoKe_Console" panose="020B0609030504040204" pitchFamily="49" charset="-128"/>
+                <a:ea typeface="MeiryoKe_Console" panose="020B0609030504040204" pitchFamily="49" charset="-128"/>
+              </a:rPr>
+              <a:t>$</a:t>
+            </a:r>
+            <a:r>
+              <a:rPr lang="ja-JP" altLang="en-US" sz="1400" b="1" u="sng" dirty="0">
+                <a:latin typeface="MeiryoKe_Console" panose="020B0609030504040204" pitchFamily="49" charset="-128"/>
+                <a:ea typeface="MeiryoKe_Console" panose="020B0609030504040204" pitchFamily="49" charset="-128"/>
+              </a:rPr>
+              <a:t> </a:t>
+            </a:r>
+            <a:r>
+              <a:rPr lang="en-US" altLang="ja-JP" sz="1400" b="1" u="sng" dirty="0">
+                <a:latin typeface="MeiryoKe_Console" panose="020B0609030504040204" pitchFamily="49" charset="-128"/>
+                <a:ea typeface="MeiryoKe_Console" panose="020B0609030504040204" pitchFamily="49" charset="-128"/>
+              </a:rPr>
+              <a:t>/</a:t>
+            </a:r>
+            <a:r>
+              <a:rPr lang="en-US" altLang="ja-JP" sz="1400" b="1" u="sng" dirty="0" err="1">
+                <a:latin typeface="MeiryoKe_Console" panose="020B0609030504040204" pitchFamily="49" charset="-128"/>
+                <a:ea typeface="MeiryoKe_Console" panose="020B0609030504040204" pitchFamily="49" charset="-128"/>
+              </a:rPr>
+              <a:t>etc</a:t>
+            </a:r>
+            <a:r>
+              <a:rPr lang="en-US" altLang="ja-JP" sz="1400" b="1" u="sng" dirty="0">
+                <a:latin typeface="MeiryoKe_Console" panose="020B0609030504040204" pitchFamily="49" charset="-128"/>
+                <a:ea typeface="MeiryoKe_Console" panose="020B0609030504040204" pitchFamily="49" charset="-128"/>
+              </a:rPr>
+              <a:t>/bind/</a:t>
+            </a:r>
+            <a:r>
+              <a:rPr lang="en-US" altLang="ja-JP" sz="1400" b="1" u="sng" dirty="0" err="1">
+                <a:latin typeface="MeiryoKe_Console" panose="020B0609030504040204" pitchFamily="49" charset="-128"/>
+                <a:ea typeface="MeiryoKe_Console" panose="020B0609030504040204" pitchFamily="49" charset="-128"/>
+              </a:rPr>
+              <a:t>named.conf</a:t>
+            </a:r>
+            <a:endParaRPr lang="en-US" altLang="ja-JP" sz="1400" b="1" u="sng" dirty="0">
+              <a:latin typeface="MeiryoKe_Console" panose="020B0609030504040204" pitchFamily="49" charset="-128"/>
+              <a:ea typeface="MeiryoKe_Console" panose="020B0609030504040204" pitchFamily="49" charset="-128"/>
+            </a:endParaRPr>
+          </a:p>
+          <a:p>
+            <a:r>
+              <a:rPr lang="en-US" altLang="ja-JP" sz="1400" dirty="0">
+                <a:latin typeface="MeiryoKe_Console" panose="020B0609030504040204" pitchFamily="49" charset="-128"/>
+                <a:ea typeface="MeiryoKe_Console" panose="020B0609030504040204" pitchFamily="49" charset="-128"/>
+              </a:rPr>
+              <a:t>zone "toshi.com" IN {</a:t>
+            </a:r>
+          </a:p>
+          <a:p>
+            <a:r>
+              <a:rPr lang="en-US" altLang="ja-JP" sz="1400" dirty="0">
+                <a:latin typeface="MeiryoKe_Console" panose="020B0609030504040204" pitchFamily="49" charset="-128"/>
+                <a:ea typeface="MeiryoKe_Console" panose="020B0609030504040204" pitchFamily="49" charset="-128"/>
+              </a:rPr>
+              <a:t> type master;</a:t>
+            </a:r>
+          </a:p>
+          <a:p>
+            <a:r>
+              <a:rPr lang="en-US" altLang="ja-JP" sz="1400" dirty="0">
+                <a:latin typeface="MeiryoKe_Console" panose="020B0609030504040204" pitchFamily="49" charset="-128"/>
+                <a:ea typeface="MeiryoKe_Console" panose="020B0609030504040204" pitchFamily="49" charset="-128"/>
+              </a:rPr>
+              <a:t> file "</a:t>
+            </a:r>
+            <a:r>
+              <a:rPr lang="en-US" altLang="ja-JP" sz="1400" dirty="0" err="1">
+                <a:latin typeface="MeiryoKe_Console" panose="020B0609030504040204" pitchFamily="49" charset="-128"/>
+                <a:ea typeface="MeiryoKe_Console" panose="020B0609030504040204" pitchFamily="49" charset="-128"/>
+              </a:rPr>
+              <a:t>toshi.com.zone</a:t>
+            </a:r>
+            <a:r>
+              <a:rPr lang="en-US" altLang="ja-JP" sz="1400" dirty="0">
+                <a:latin typeface="MeiryoKe_Console" panose="020B0609030504040204" pitchFamily="49" charset="-128"/>
+                <a:ea typeface="MeiryoKe_Console" panose="020B0609030504040204" pitchFamily="49" charset="-128"/>
+              </a:rPr>
+              <a:t>";</a:t>
+            </a:r>
+          </a:p>
+          <a:p>
+            <a:r>
+              <a:rPr lang="en-US" altLang="ja-JP" sz="1400" dirty="0">
+                <a:latin typeface="MeiryoKe_Console" panose="020B0609030504040204" pitchFamily="49" charset="-128"/>
+                <a:ea typeface="MeiryoKe_Console" panose="020B0609030504040204" pitchFamily="49" charset="-128"/>
+              </a:rPr>
+              <a:t> notify no;</a:t>
+            </a:r>
+          </a:p>
+          <a:p>
+            <a:r>
+              <a:rPr lang="en-US" altLang="ja-JP" sz="1400" dirty="0">
+                <a:latin typeface="MeiryoKe_Console" panose="020B0609030504040204" pitchFamily="49" charset="-128"/>
+                <a:ea typeface="MeiryoKe_Console" panose="020B0609030504040204" pitchFamily="49" charset="-128"/>
+              </a:rPr>
+              <a:t>};	</a:t>
+            </a:r>
+          </a:p>
+          <a:p>
+            <a:r>
+              <a:rPr lang="en-US" altLang="ja-JP" sz="1400" dirty="0">
+                <a:latin typeface="MeiryoKe_Console" panose="020B0609030504040204" pitchFamily="49" charset="-128"/>
+                <a:ea typeface="MeiryoKe_Console" panose="020B0609030504040204" pitchFamily="49" charset="-128"/>
+              </a:rPr>
+              <a:t>zone "168.192.in-addr.arpa" IN {</a:t>
+            </a:r>
+          </a:p>
+          <a:p>
+            <a:r>
+              <a:rPr lang="en-US" altLang="ja-JP" sz="1400" dirty="0">
+                <a:latin typeface="MeiryoKe_Console" panose="020B0609030504040204" pitchFamily="49" charset="-128"/>
+                <a:ea typeface="MeiryoKe_Console" panose="020B0609030504040204" pitchFamily="49" charset="-128"/>
+              </a:rPr>
+              <a:t> type master;</a:t>
+            </a:r>
+          </a:p>
+          <a:p>
+            <a:r>
+              <a:rPr lang="en-US" altLang="ja-JP" sz="1400" dirty="0">
+                <a:latin typeface="MeiryoKe_Console" panose="020B0609030504040204" pitchFamily="49" charset="-128"/>
+                <a:ea typeface="MeiryoKe_Console" panose="020B0609030504040204" pitchFamily="49" charset="-128"/>
+              </a:rPr>
+              <a:t> file "168.192.zone";</a:t>
+            </a:r>
+          </a:p>
+          <a:p>
+            <a:r>
+              <a:rPr lang="en-US" altLang="ja-JP" sz="1400" dirty="0">
+                <a:latin typeface="MeiryoKe_Console" panose="020B0609030504040204" pitchFamily="49" charset="-128"/>
+                <a:ea typeface="MeiryoKe_Console" panose="020B0609030504040204" pitchFamily="49" charset="-128"/>
+              </a:rPr>
+              <a:t> notify no;</a:t>
+            </a:r>
+          </a:p>
+          <a:p>
+            <a:r>
+              <a:rPr lang="en-US" altLang="ja-JP" sz="1400" dirty="0">
+                <a:latin typeface="MeiryoKe_Console" panose="020B0609030504040204" pitchFamily="49" charset="-128"/>
+                <a:ea typeface="MeiryoKe_Console" panose="020B0609030504040204" pitchFamily="49" charset="-128"/>
+              </a:rPr>
+              <a:t>};</a:t>
+            </a:r>
+          </a:p>
+        </p:txBody>
+      </p:sp>
       <p:sp>
         <p:nvSpPr>
-          <p:cNvPr id="12" name="テキスト ボックス 11">
-            <a:extLst>
-              <a:ext uri="{FF2B5EF4-FFF2-40B4-BE49-F238E27FC236}">
-                <a16:creationId xmlns:a16="http://schemas.microsoft.com/office/drawing/2014/main" id="{DF4A532F-D36C-4BE9-BE88-D7CE4E7BA6F1}"/>
+          <p:cNvPr id="8" name="テキスト ボックス 7">
+            <a:extLst>
+              <a:ext uri="{FF2B5EF4-FFF2-40B4-BE49-F238E27FC236}">
+                <a16:creationId xmlns:a16="http://schemas.microsoft.com/office/drawing/2014/main" id="{C9DEB816-2591-43D9-9044-DD48B3495FA3}"/>
               </a:ext>
             </a:extLst>
           </p:cNvPr>
@@ -5095,8 +4874,76 @@
         </p:nvSpPr>
         <p:spPr>
           <a:xfrm>
-            <a:off x="9748299" y="767415"/>
-            <a:ext cx="1832553" cy="369332"/>
+            <a:off x="6185307" y="560715"/>
+            <a:ext cx="3446104" cy="923330"/>
+          </a:xfrm>
+          <a:prstGeom prst="rect">
+            <a:avLst/>
+          </a:prstGeom>
+          <a:solidFill>
+            <a:schemeClr val="accent2">
+              <a:lumMod val="20000"/>
+              <a:lumOff val="80000"/>
+            </a:schemeClr>
+          </a:solidFill>
+        </p:spPr>
+        <p:txBody>
+          <a:bodyPr wrap="square">
+            <a:spAutoFit/>
+          </a:bodyPr>
+          <a:lstStyle/>
+          <a:p>
+            <a:r>
+              <a:rPr lang="en-US" altLang="ja-JP" dirty="0"/>
+              <a:t>Zone toshi.com</a:t>
+            </a:r>
+          </a:p>
+          <a:p>
+            <a:r>
+              <a:rPr lang="en-US" altLang="ja-JP" dirty="0"/>
+              <a:t>192.168.10.17</a:t>
+            </a:r>
+            <a:r>
+              <a:rPr lang="ja-JP" altLang="en-US" dirty="0"/>
+              <a:t> </a:t>
+            </a:r>
+            <a:r>
+              <a:rPr lang="en-US" altLang="ja-JP" dirty="0"/>
+              <a:t>=</a:t>
+            </a:r>
+            <a:r>
+              <a:rPr lang="ja-JP" altLang="en-US" dirty="0"/>
+              <a:t> </a:t>
+            </a:r>
+            <a:r>
+              <a:rPr lang="en-US" altLang="ja-JP" dirty="0"/>
+              <a:t>linuxbean1</a:t>
+            </a:r>
+          </a:p>
+          <a:p>
+            <a:r>
+              <a:rPr lang="en-US" altLang="ja-JP" dirty="0"/>
+              <a:t>192.168.10.18 = cento-server</a:t>
+            </a:r>
+          </a:p>
+        </p:txBody>
+      </p:sp>
+      <p:sp>
+        <p:nvSpPr>
+          <p:cNvPr id="9" name="テキスト ボックス 8">
+            <a:extLst>
+              <a:ext uri="{FF2B5EF4-FFF2-40B4-BE49-F238E27FC236}">
+                <a16:creationId xmlns:a16="http://schemas.microsoft.com/office/drawing/2014/main" id="{D41FFEA2-5486-44B5-B39B-4023A62B032C}"/>
+              </a:ext>
+            </a:extLst>
+          </p:cNvPr>
+          <p:cNvSpPr txBox="1"/>
+          <p:nvPr/>
+        </p:nvSpPr>
+        <p:spPr>
+          <a:xfrm>
+            <a:off x="5748793" y="1582384"/>
+            <a:ext cx="5621572" cy="3539430"/>
           </a:xfrm>
           <a:prstGeom prst="rect">
             <a:avLst/>
@@ -5104,75 +4951,228 @@
           <a:noFill/>
         </p:spPr>
         <p:txBody>
-          <a:bodyPr wrap="none" rtlCol="0">
+          <a:bodyPr wrap="square">
             <a:spAutoFit/>
           </a:bodyPr>
           <a:lstStyle/>
           <a:p>
             <a:r>
-              <a:rPr kumimoji="1" lang="en-US" altLang="ja-JP" dirty="0"/>
-              <a:t>Cisco CSR1000V</a:t>
-            </a:r>
-            <a:endParaRPr kumimoji="1" lang="ja-JP" altLang="en-US" dirty="0"/>
-          </a:p>
-        </p:txBody>
-      </p:sp>
-      <p:sp>
-        <p:nvSpPr>
-          <p:cNvPr id="13" name="乗算記号 12">
-            <a:extLst>
-              <a:ext uri="{FF2B5EF4-FFF2-40B4-BE49-F238E27FC236}">
-                <a16:creationId xmlns:a16="http://schemas.microsoft.com/office/drawing/2014/main" id="{5631C466-A9C3-422B-831C-692ADE82EFBD}"/>
-              </a:ext>
-            </a:extLst>
-          </p:cNvPr>
-          <p:cNvSpPr/>
-          <p:nvPr/>
-        </p:nvSpPr>
-        <p:spPr>
-          <a:xfrm>
-            <a:off x="6758610" y="2999629"/>
-            <a:ext cx="834887" cy="858741"/>
-          </a:xfrm>
-          <a:prstGeom prst="mathMultiply">
-            <a:avLst/>
-          </a:prstGeom>
-          <a:solidFill>
-            <a:schemeClr val="accent2"/>
-          </a:solidFill>
-          <a:ln>
-            <a:noFill/>
-          </a:ln>
-        </p:spPr>
-        <p:style>
-          <a:lnRef idx="2">
-            <a:schemeClr val="accent1">
-              <a:shade val="50000"/>
-            </a:schemeClr>
-          </a:lnRef>
-          <a:fillRef idx="1">
-            <a:schemeClr val="accent1"/>
-          </a:fillRef>
-          <a:effectRef idx="0">
-            <a:schemeClr val="accent1"/>
-          </a:effectRef>
-          <a:fontRef idx="minor">
-            <a:schemeClr val="lt1"/>
-          </a:fontRef>
-        </p:style>
-        <p:txBody>
-          <a:bodyPr rtlCol="0" anchor="ctr"/>
-          <a:lstStyle/>
-          <a:p>
-            <a:pPr algn="ctr"/>
-            <a:endParaRPr kumimoji="1" lang="ja-JP" altLang="en-US"/>
+              <a:rPr lang="en-US" altLang="ja-JP" sz="1400" b="1" u="sng" dirty="0">
+                <a:latin typeface="MeiryoKe_Console" panose="020B0609030504040204" pitchFamily="49" charset="-128"/>
+                <a:ea typeface="MeiryoKe_Console" panose="020B0609030504040204" pitchFamily="49" charset="-128"/>
+              </a:rPr>
+              <a:t>$ /var/cache/bind/</a:t>
+            </a:r>
+            <a:r>
+              <a:rPr lang="en-US" altLang="ja-JP" sz="1400" b="1" u="sng" dirty="0" err="1">
+                <a:latin typeface="MeiryoKe_Console" panose="020B0609030504040204" pitchFamily="49" charset="-128"/>
+                <a:ea typeface="MeiryoKe_Console" panose="020B0609030504040204" pitchFamily="49" charset="-128"/>
+              </a:rPr>
+              <a:t>toshi.com.zone</a:t>
+            </a:r>
+            <a:endParaRPr lang="en-US" altLang="ja-JP" sz="1400" b="1" u="sng" dirty="0">
+              <a:latin typeface="MeiryoKe_Console" panose="020B0609030504040204" pitchFamily="49" charset="-128"/>
+              <a:ea typeface="MeiryoKe_Console" panose="020B0609030504040204" pitchFamily="49" charset="-128"/>
+            </a:endParaRPr>
+          </a:p>
+          <a:p>
+            <a:r>
+              <a:rPr lang="en-US" altLang="ja-JP" sz="1400" dirty="0">
+                <a:latin typeface="MeiryoKe_Console" panose="020B0609030504040204" pitchFamily="49" charset="-128"/>
+                <a:ea typeface="MeiryoKe_Console" panose="020B0609030504040204" pitchFamily="49" charset="-128"/>
+              </a:rPr>
+              <a:t>@ IN SOA linuxbean1.toshi.com. root.toshi.com. (</a:t>
+            </a:r>
+          </a:p>
+          <a:p>
+            <a:r>
+              <a:rPr lang="en-US" altLang="ja-JP" sz="1400" dirty="0">
+                <a:latin typeface="MeiryoKe_Console" panose="020B0609030504040204" pitchFamily="49" charset="-128"/>
+                <a:ea typeface="MeiryoKe_Console" panose="020B0609030504040204" pitchFamily="49" charset="-128"/>
+              </a:rPr>
+              <a:t>	      IN      NS      linuxbean1.toshi.com.</a:t>
+            </a:r>
+          </a:p>
+          <a:p>
+            <a:r>
+              <a:rPr lang="en-US" altLang="ja-JP" sz="1400" dirty="0">
+                <a:latin typeface="MeiryoKe_Console" panose="020B0609030504040204" pitchFamily="49" charset="-128"/>
+                <a:ea typeface="MeiryoKe_Console" panose="020B0609030504040204" pitchFamily="49" charset="-128"/>
+              </a:rPr>
+              <a:t>                IN      NS      centos-server.toshi.com.</a:t>
+            </a:r>
+          </a:p>
+          <a:p>
+            <a:r>
+              <a:rPr lang="en-US" altLang="ja-JP" sz="1400" dirty="0">
+                <a:latin typeface="MeiryoKe_Console" panose="020B0609030504040204" pitchFamily="49" charset="-128"/>
+                <a:ea typeface="MeiryoKe_Console" panose="020B0609030504040204" pitchFamily="49" charset="-128"/>
+              </a:rPr>
+              <a:t>                IN      NS      </a:t>
+            </a:r>
+            <a:r>
+              <a:rPr lang="en-US" altLang="ja-JP" sz="1400" dirty="0" err="1">
+                <a:latin typeface="MeiryoKe_Console" panose="020B0609030504040204" pitchFamily="49" charset="-128"/>
+                <a:ea typeface="MeiryoKe_Console" panose="020B0609030504040204" pitchFamily="49" charset="-128"/>
+              </a:rPr>
+              <a:t>speedwifi.home</a:t>
+            </a:r>
+            <a:r>
+              <a:rPr lang="en-US" altLang="ja-JP" sz="1400" dirty="0">
+                <a:latin typeface="MeiryoKe_Console" panose="020B0609030504040204" pitchFamily="49" charset="-128"/>
+                <a:ea typeface="MeiryoKe_Console" panose="020B0609030504040204" pitchFamily="49" charset="-128"/>
+              </a:rPr>
+              <a:t>.</a:t>
+            </a:r>
+          </a:p>
+          <a:p>
+            <a:r>
+              <a:rPr lang="en-US" altLang="ja-JP" sz="1400" dirty="0">
+                <a:latin typeface="MeiryoKe_Console" panose="020B0609030504040204" pitchFamily="49" charset="-128"/>
+                <a:ea typeface="MeiryoKe_Console" panose="020B0609030504040204" pitchFamily="49" charset="-128"/>
+              </a:rPr>
+              <a:t>                IN      NS      </a:t>
+            </a:r>
+            <a:r>
+              <a:rPr lang="en-US" altLang="ja-JP" sz="1400" dirty="0" err="1">
+                <a:latin typeface="MeiryoKe_Console" panose="020B0609030504040204" pitchFamily="49" charset="-128"/>
+                <a:ea typeface="MeiryoKe_Console" panose="020B0609030504040204" pitchFamily="49" charset="-128"/>
+              </a:rPr>
+              <a:t>toshi.oppo</a:t>
+            </a:r>
+            <a:r>
+              <a:rPr lang="en-US" altLang="ja-JP" sz="1400" dirty="0">
+                <a:latin typeface="MeiryoKe_Console" panose="020B0609030504040204" pitchFamily="49" charset="-128"/>
+                <a:ea typeface="MeiryoKe_Console" panose="020B0609030504040204" pitchFamily="49" charset="-128"/>
+              </a:rPr>
+              <a:t>.</a:t>
+            </a:r>
+          </a:p>
+          <a:p>
+            <a:r>
+              <a:rPr lang="en-US" altLang="ja-JP" sz="1400" dirty="0">
+                <a:latin typeface="MeiryoKe_Console" panose="020B0609030504040204" pitchFamily="49" charset="-128"/>
+                <a:ea typeface="MeiryoKe_Console" panose="020B0609030504040204" pitchFamily="49" charset="-128"/>
+              </a:rPr>
+              <a:t>linuxbean1 	IN 	A 	192.168.10.17</a:t>
+            </a:r>
+          </a:p>
+          <a:p>
+            <a:r>
+              <a:rPr lang="en-US" altLang="ja-JP" sz="1400" dirty="0">
+                <a:latin typeface="MeiryoKe_Console" panose="020B0609030504040204" pitchFamily="49" charset="-128"/>
+                <a:ea typeface="MeiryoKe_Console" panose="020B0609030504040204" pitchFamily="49" charset="-128"/>
+              </a:rPr>
+              <a:t>centos-server	IN	A	192.168.10.18</a:t>
+            </a:r>
+          </a:p>
+          <a:p>
+            <a:endParaRPr lang="en-US" altLang="ja-JP" sz="1400" dirty="0">
+              <a:latin typeface="MeiryoKe_Console" panose="020B0609030504040204" pitchFamily="49" charset="-128"/>
+              <a:ea typeface="MeiryoKe_Console" panose="020B0609030504040204" pitchFamily="49" charset="-128"/>
+            </a:endParaRPr>
+          </a:p>
+          <a:p>
+            <a:r>
+              <a:rPr lang="it-IT" altLang="ja-JP" sz="1400" b="1" u="sng" dirty="0">
+                <a:latin typeface="MeiryoKe_Console" panose="020B0609030504040204" pitchFamily="49" charset="-128"/>
+                <a:ea typeface="MeiryoKe_Console" panose="020B0609030504040204" pitchFamily="49" charset="-128"/>
+              </a:rPr>
+              <a:t>$ /var/cache/bind/168.192.zone</a:t>
+            </a:r>
+          </a:p>
+          <a:p>
+            <a:r>
+              <a:rPr lang="en-US" altLang="ja-JP" sz="1400" dirty="0">
+                <a:latin typeface="MeiryoKe_Console" panose="020B0609030504040204" pitchFamily="49" charset="-128"/>
+                <a:ea typeface="MeiryoKe_Console" panose="020B0609030504040204" pitchFamily="49" charset="-128"/>
+              </a:rPr>
+              <a:t>	IN 	NS 	linuxbean1.toshi.com.</a:t>
+            </a:r>
+          </a:p>
+          <a:p>
+            <a:r>
+              <a:rPr lang="en-US" altLang="ja-JP" sz="1400" dirty="0">
+                <a:latin typeface="MeiryoKe_Console" panose="020B0609030504040204" pitchFamily="49" charset="-128"/>
+                <a:ea typeface="MeiryoKe_Console" panose="020B0609030504040204" pitchFamily="49" charset="-128"/>
+              </a:rPr>
+              <a:t>	IN	NS	centos-server.toshi.com.</a:t>
+            </a:r>
+          </a:p>
+          <a:p>
+            <a:r>
+              <a:rPr lang="en-US" altLang="ja-JP" sz="1400" dirty="0">
+                <a:latin typeface="MeiryoKe_Console" panose="020B0609030504040204" pitchFamily="49" charset="-128"/>
+                <a:ea typeface="MeiryoKe_Console" panose="020B0609030504040204" pitchFamily="49" charset="-128"/>
+              </a:rPr>
+              <a:t>	IN	NS	</a:t>
+            </a:r>
+            <a:r>
+              <a:rPr lang="en-US" altLang="ja-JP" sz="1400" dirty="0" err="1">
+                <a:latin typeface="MeiryoKe_Console" panose="020B0609030504040204" pitchFamily="49" charset="-128"/>
+                <a:ea typeface="MeiryoKe_Console" panose="020B0609030504040204" pitchFamily="49" charset="-128"/>
+              </a:rPr>
+              <a:t>speedwifi.home</a:t>
+            </a:r>
+            <a:r>
+              <a:rPr lang="en-US" altLang="ja-JP" sz="1400" dirty="0">
+                <a:latin typeface="MeiryoKe_Console" panose="020B0609030504040204" pitchFamily="49" charset="-128"/>
+                <a:ea typeface="MeiryoKe_Console" panose="020B0609030504040204" pitchFamily="49" charset="-128"/>
+              </a:rPr>
+              <a:t>.</a:t>
+            </a:r>
+          </a:p>
+          <a:p>
+            <a:r>
+              <a:rPr lang="en-US" altLang="ja-JP" sz="1400" dirty="0">
+                <a:latin typeface="MeiryoKe_Console" panose="020B0609030504040204" pitchFamily="49" charset="-128"/>
+                <a:ea typeface="MeiryoKe_Console" panose="020B0609030504040204" pitchFamily="49" charset="-128"/>
+              </a:rPr>
+              <a:t>	IN	NS	</a:t>
+            </a:r>
+            <a:r>
+              <a:rPr lang="en-US" altLang="ja-JP" sz="1400" dirty="0" err="1">
+                <a:latin typeface="MeiryoKe_Console" panose="020B0609030504040204" pitchFamily="49" charset="-128"/>
+                <a:ea typeface="MeiryoKe_Console" panose="020B0609030504040204" pitchFamily="49" charset="-128"/>
+              </a:rPr>
+              <a:t>toshi.oppo</a:t>
+            </a:r>
+            <a:r>
+              <a:rPr lang="en-US" altLang="ja-JP" sz="1400" dirty="0">
+                <a:latin typeface="MeiryoKe_Console" panose="020B0609030504040204" pitchFamily="49" charset="-128"/>
+                <a:ea typeface="MeiryoKe_Console" panose="020B0609030504040204" pitchFamily="49" charset="-128"/>
+              </a:rPr>
+              <a:t>.</a:t>
+            </a:r>
+          </a:p>
+          <a:p>
+            <a:r>
+              <a:rPr lang="en-US" altLang="ja-JP" sz="1400" dirty="0">
+                <a:latin typeface="MeiryoKe_Console" panose="020B0609030504040204" pitchFamily="49" charset="-128"/>
+                <a:ea typeface="MeiryoKe_Console" panose="020B0609030504040204" pitchFamily="49" charset="-128"/>
+              </a:rPr>
+              <a:t>17.10 	IN 	PTR 	linuxbean1.toshi.com.</a:t>
+            </a:r>
+          </a:p>
+          <a:p>
+            <a:r>
+              <a:rPr lang="pt-BR" altLang="ja-JP" sz="1400" dirty="0">
+                <a:latin typeface="MeiryoKe_Console" panose="020B0609030504040204" pitchFamily="49" charset="-128"/>
+                <a:ea typeface="MeiryoKe_Console" panose="020B0609030504040204" pitchFamily="49" charset="-128"/>
+              </a:rPr>
+              <a:t>18.10	IN	PTR	centos-server.toshi.com.</a:t>
+            </a:r>
+            <a:endParaRPr lang="en-US" altLang="ja-JP" sz="1400" dirty="0">
+              <a:latin typeface="MeiryoKe_Console" panose="020B0609030504040204" pitchFamily="49" charset="-128"/>
+              <a:ea typeface="MeiryoKe_Console" panose="020B0609030504040204" pitchFamily="49" charset="-128"/>
+            </a:endParaRPr>
           </a:p>
         </p:txBody>
       </p:sp>
     </p:spTree>
     <p:extLst>
       <p:ext uri="{BB962C8B-B14F-4D97-AF65-F5344CB8AC3E}">
-        <p14:creationId xmlns:p14="http://schemas.microsoft.com/office/powerpoint/2010/main" val="2857905600"/>
+        <p14:creationId xmlns:p14="http://schemas.microsoft.com/office/powerpoint/2010/main" val="4043853895"/>
       </p:ext>
     </p:extLst>
   </p:cSld>
@@ -9071,21 +9071,6 @@
 </file>
 
 <file path=customXml/item1.xml><?xml version="1.0" encoding="utf-8"?>
-<?mso-contentType ?>
-<FormTemplates xmlns="http://schemas.microsoft.com/sharepoint/v3/contenttype/forms">
-  <Display>DocumentLibraryForm</Display>
-  <Edit>DocumentLibraryForm</Edit>
-  <New>DocumentLibraryForm</New>
-</FormTemplates>
-</file>
-
-<file path=customXml/item2.xml><?xml version="1.0" encoding="utf-8"?>
-<p:properties xmlns:p="http://schemas.microsoft.com/office/2006/metadata/properties" xmlns:xsi="http://www.w3.org/2001/XMLSchema-instance" xmlns:pc="http://schemas.microsoft.com/office/infopath/2007/PartnerControls">
-  <documentManagement/>
-</p:properties>
-</file>
-
-<file path=customXml/item3.xml><?xml version="1.0" encoding="utf-8"?>
 <ct:contentTypeSchema xmlns:ct="http://schemas.microsoft.com/office/2006/metadata/contentType" xmlns:ma="http://schemas.microsoft.com/office/2006/metadata/properties/metaAttributes" ct:_="" ma:_="" ma:contentTypeName="ドキュメント" ma:contentTypeID="0x01010071EAB1FA99EFB44F82A3975D1A88957C" ma:contentTypeVersion="13" ma:contentTypeDescription="新しいドキュメントを作成します。" ma:contentTypeScope="" ma:versionID="a5b43efd13aae72528c89f3e83079cb4">
   <xsd:schema xmlns:xsd="http://www.w3.org/2001/XMLSchema" xmlns:xs="http://www.w3.org/2001/XMLSchema" xmlns:p="http://schemas.microsoft.com/office/2006/metadata/properties" xmlns:ns3="7b1ea5f3-a8f5-4f16-bf6e-99cd9bc86c5e" xmlns:ns4="541cbb2e-3851-42da-b085-f65db3650115" targetNamespace="http://schemas.microsoft.com/office/2006/metadata/properties" ma:root="true" ma:fieldsID="504f0966f05a8592ce7ccab7d40b64d1" ns3:_="" ns4:_="">
     <xsd:import namespace="7b1ea5f3-a8f5-4f16-bf6e-99cd9bc86c5e"/>
@@ -9308,24 +9293,22 @@
 </ct:contentTypeSchema>
 </file>
 
-<file path=customXml/itemProps1.xml><?xml version="1.0" encoding="utf-8"?>
-<ds:datastoreItem xmlns:ds="http://schemas.openxmlformats.org/officeDocument/2006/customXml" ds:itemID="{F244EC05-59F8-4762-B77F-2A42DFA0AC24}">
-  <ds:schemaRefs>
-    <ds:schemaRef ds:uri="http://schemas.microsoft.com/sharepoint/v3/contenttype/forms"/>
-  </ds:schemaRefs>
-</ds:datastoreItem>
+<file path=customXml/item2.xml><?xml version="1.0" encoding="utf-8"?>
+<p:properties xmlns:p="http://schemas.microsoft.com/office/2006/metadata/properties" xmlns:xsi="http://www.w3.org/2001/XMLSchema-instance" xmlns:pc="http://schemas.microsoft.com/office/infopath/2007/PartnerControls">
+  <documentManagement/>
+</p:properties>
 </file>
 
-<file path=customXml/itemProps2.xml><?xml version="1.0" encoding="utf-8"?>
-<ds:datastoreItem xmlns:ds="http://schemas.openxmlformats.org/officeDocument/2006/customXml" ds:itemID="{E42C00D7-45D6-4B81-B1E3-C6AC5B365E12}">
-  <ds:schemaRefs>
-    <ds:schemaRef ds:uri="http://schemas.microsoft.com/office/2006/metadata/properties"/>
-    <ds:schemaRef ds:uri="http://schemas.microsoft.com/office/infopath/2007/PartnerControls"/>
-  </ds:schemaRefs>
-</ds:datastoreItem>
+<file path=customXml/item3.xml><?xml version="1.0" encoding="utf-8"?>
+<?mso-contentType ?>
+<FormTemplates xmlns="http://schemas.microsoft.com/sharepoint/v3/contenttype/forms">
+  <Display>DocumentLibraryForm</Display>
+  <Edit>DocumentLibraryForm</Edit>
+  <New>DocumentLibraryForm</New>
+</FormTemplates>
 </file>
 
-<file path=customXml/itemProps3.xml><?xml version="1.0" encoding="utf-8"?>
+<file path=customXml/itemProps1.xml><?xml version="1.0" encoding="utf-8"?>
 <ds:datastoreItem xmlns:ds="http://schemas.openxmlformats.org/officeDocument/2006/customXml" ds:itemID="{B79E2177-E7D5-4E9F-82A6-C526CF571B8C}">
   <ds:schemaRefs>
     <ds:schemaRef ds:uri="http://schemas.microsoft.com/office/2006/metadata/contentType"/>
@@ -9342,4 +9325,21 @@
     <ds:schemaRef ds:uri="http://schemas.microsoft.com/internal/obd"/>
   </ds:schemaRefs>
 </ds:datastoreItem>
+</file>
+
+<file path=customXml/itemProps2.xml><?xml version="1.0" encoding="utf-8"?>
+<ds:datastoreItem xmlns:ds="http://schemas.openxmlformats.org/officeDocument/2006/customXml" ds:itemID="{E42C00D7-45D6-4B81-B1E3-C6AC5B365E12}">
+  <ds:schemaRefs>
+    <ds:schemaRef ds:uri="http://schemas.microsoft.com/office/2006/metadata/properties"/>
+    <ds:schemaRef ds:uri="http://schemas.microsoft.com/office/infopath/2007/PartnerControls"/>
+  </ds:schemaRefs>
+</ds:datastoreItem>
+</file>
+
+<file path=customXml/itemProps3.xml><?xml version="1.0" encoding="utf-8"?>
+<ds:datastoreItem xmlns:ds="http://schemas.openxmlformats.org/officeDocument/2006/customXml" ds:itemID="{F244EC05-59F8-4762-B77F-2A42DFA0AC24}">
+  <ds:schemaRefs>
+    <ds:schemaRef ds:uri="http://schemas.microsoft.com/sharepoint/v3/contenttype/forms"/>
+  </ds:schemaRefs>
+</ds:datastoreItem>
 </file>
</xml_diff>